<commit_message>
adding stadium location csv and ppt updates
</commit_message>
<xml_diff>
--- a/CHADS_CODING/CRIME + NFL.pptx
+++ b/CHADS_CODING/CRIME + NFL.pptx
@@ -10,7 +10,7 @@
     <p:sldId id="259" r:id="rId4"/>
     <p:sldId id="261" r:id="rId5"/>
     <p:sldId id="258" r:id="rId6"/>
-    <p:sldId id="260" r:id="rId7"/>
+    <p:sldId id="262" r:id="rId7"/>
   </p:sldIdLst>
   <p:sldSz cx="12192000" cy="6858000"/>
   <p:notesSz cx="6858000" cy="9144000"/>
@@ -109,6 +109,11 @@
       </a:defRPr>
     </a:lvl9pPr>
   </p:defaultTextStyle>
+  <p:extLst>
+    <p:ext uri="{EFAFB233-063F-42B5-8137-9DF3F51BA10A}">
+      <p15:sldGuideLst xmlns:p15="http://schemas.microsoft.com/office/powerpoint/2012/main"/>
+    </p:ext>
+  </p:extLst>
 </p:presentation>
 </file>
 
@@ -259,7 +264,7 @@
           <a:p>
             <a:fld id="{AEB1A662-EF76-44BE-8BB6-1C3AC9FAFF46}" type="datetimeFigureOut">
               <a:rPr lang="en-US" smtClean="0"/>
-              <a:t>1/27/2020</a:t>
+              <a:t>2/1/2020</a:t>
             </a:fld>
             <a:endParaRPr lang="en-US"/>
           </a:p>
@@ -457,7 +462,7 @@
           <a:p>
             <a:fld id="{AEB1A662-EF76-44BE-8BB6-1C3AC9FAFF46}" type="datetimeFigureOut">
               <a:rPr lang="en-US" smtClean="0"/>
-              <a:t>1/27/2020</a:t>
+              <a:t>2/1/2020</a:t>
             </a:fld>
             <a:endParaRPr lang="en-US"/>
           </a:p>
@@ -665,7 +670,7 @@
           <a:p>
             <a:fld id="{AEB1A662-EF76-44BE-8BB6-1C3AC9FAFF46}" type="datetimeFigureOut">
               <a:rPr lang="en-US" smtClean="0"/>
-              <a:t>1/27/2020</a:t>
+              <a:t>2/1/2020</a:t>
             </a:fld>
             <a:endParaRPr lang="en-US"/>
           </a:p>
@@ -863,7 +868,7 @@
           <a:p>
             <a:fld id="{AEB1A662-EF76-44BE-8BB6-1C3AC9FAFF46}" type="datetimeFigureOut">
               <a:rPr lang="en-US" smtClean="0"/>
-              <a:t>1/27/2020</a:t>
+              <a:t>2/1/2020</a:t>
             </a:fld>
             <a:endParaRPr lang="en-US"/>
           </a:p>
@@ -1138,7 +1143,7 @@
           <a:p>
             <a:fld id="{AEB1A662-EF76-44BE-8BB6-1C3AC9FAFF46}" type="datetimeFigureOut">
               <a:rPr lang="en-US" smtClean="0"/>
-              <a:t>1/27/2020</a:t>
+              <a:t>2/1/2020</a:t>
             </a:fld>
             <a:endParaRPr lang="en-US"/>
           </a:p>
@@ -1403,7 +1408,7 @@
           <a:p>
             <a:fld id="{AEB1A662-EF76-44BE-8BB6-1C3AC9FAFF46}" type="datetimeFigureOut">
               <a:rPr lang="en-US" smtClean="0"/>
-              <a:t>1/27/2020</a:t>
+              <a:t>2/1/2020</a:t>
             </a:fld>
             <a:endParaRPr lang="en-US"/>
           </a:p>
@@ -1815,7 +1820,7 @@
           <a:p>
             <a:fld id="{AEB1A662-EF76-44BE-8BB6-1C3AC9FAFF46}" type="datetimeFigureOut">
               <a:rPr lang="en-US" smtClean="0"/>
-              <a:t>1/27/2020</a:t>
+              <a:t>2/1/2020</a:t>
             </a:fld>
             <a:endParaRPr lang="en-US"/>
           </a:p>
@@ -1956,7 +1961,7 @@
           <a:p>
             <a:fld id="{AEB1A662-EF76-44BE-8BB6-1C3AC9FAFF46}" type="datetimeFigureOut">
               <a:rPr lang="en-US" smtClean="0"/>
-              <a:t>1/27/2020</a:t>
+              <a:t>2/1/2020</a:t>
             </a:fld>
             <a:endParaRPr lang="en-US"/>
           </a:p>
@@ -2069,7 +2074,7 @@
           <a:p>
             <a:fld id="{AEB1A662-EF76-44BE-8BB6-1C3AC9FAFF46}" type="datetimeFigureOut">
               <a:rPr lang="en-US" smtClean="0"/>
-              <a:t>1/27/2020</a:t>
+              <a:t>2/1/2020</a:t>
             </a:fld>
             <a:endParaRPr lang="en-US"/>
           </a:p>
@@ -2380,7 +2385,7 @@
           <a:p>
             <a:fld id="{AEB1A662-EF76-44BE-8BB6-1C3AC9FAFF46}" type="datetimeFigureOut">
               <a:rPr lang="en-US" smtClean="0"/>
-              <a:t>1/27/2020</a:t>
+              <a:t>2/1/2020</a:t>
             </a:fld>
             <a:endParaRPr lang="en-US"/>
           </a:p>
@@ -2668,7 +2673,7 @@
           <a:p>
             <a:fld id="{AEB1A662-EF76-44BE-8BB6-1C3AC9FAFF46}" type="datetimeFigureOut">
               <a:rPr lang="en-US" smtClean="0"/>
-              <a:t>1/27/2020</a:t>
+              <a:t>2/1/2020</a:t>
             </a:fld>
             <a:endParaRPr lang="en-US"/>
           </a:p>
@@ -2909,7 +2914,7 @@
           <a:p>
             <a:fld id="{AEB1A662-EF76-44BE-8BB6-1C3AC9FAFF46}" type="datetimeFigureOut">
               <a:rPr lang="en-US" smtClean="0"/>
-              <a:t>1/27/2020</a:t>
+              <a:t>2/1/2020</a:t>
             </a:fld>
             <a:endParaRPr lang="en-US"/>
           </a:p>
@@ -3898,20 +3903,28 @@
             <p:ph type="title"/>
           </p:nvPr>
         </p:nvSpPr>
-        <p:spPr/>
-        <p:txBody>
-          <a:bodyPr/>
-          <a:lstStyle/>
-          <a:p>
+        <p:spPr>
+          <a:xfrm>
+            <a:off x="838200" y="163000"/>
+            <a:ext cx="10515600" cy="568526"/>
+          </a:xfrm>
+          <a:ln w="28575">
+            <a:solidFill>
+              <a:schemeClr val="tx1"/>
+            </a:solidFill>
+          </a:ln>
+        </p:spPr>
+        <p:txBody>
+          <a:bodyPr>
+            <a:normAutofit fontScale="90000"/>
+          </a:bodyPr>
+          <a:lstStyle/>
+          <a:p>
+            <a:pPr algn="ctr"/>
             <a:r>
               <a:rPr lang="en-US" dirty="0"/>
-              <a:t>Stacked Bar Graph of Crime &amp; </a:t>
-            </a:r>
-            <a:r>
-              <a:rPr lang="en-US" dirty="0" err="1"/>
-              <a:t>possition</a:t>
-            </a:r>
-            <a:endParaRPr lang="en-US" dirty="0"/>
+              <a:t>HEADER – TOPIC/QUESTION</a:t>
+            </a:r>
           </a:p>
         </p:txBody>
       </p:sp>
@@ -3931,15 +3944,531 @@
             <p:ph idx="1"/>
           </p:nvPr>
         </p:nvSpPr>
-        <p:spPr/>
-        <p:txBody>
-          <a:bodyPr/>
-          <a:lstStyle/>
-          <a:p>
-            <a:endParaRPr lang="en-US"/>
-          </a:p>
-        </p:txBody>
-      </p:sp>
+        <p:spPr>
+          <a:xfrm>
+            <a:off x="105879" y="1075621"/>
+            <a:ext cx="3378468" cy="5417252"/>
+          </a:xfrm>
+          <a:ln>
+            <a:solidFill>
+              <a:schemeClr val="tx1"/>
+            </a:solidFill>
+          </a:ln>
+        </p:spPr>
+        <p:txBody>
+          <a:bodyPr/>
+          <a:lstStyle/>
+          <a:p>
+            <a:pPr marL="0" indent="0" algn="ctr">
+              <a:buNone/>
+            </a:pPr>
+            <a:r>
+              <a:rPr lang="en-US" dirty="0"/>
+              <a:t>CODE IMAGE</a:t>
+            </a:r>
+          </a:p>
+        </p:txBody>
+      </p:sp>
+      <p:sp>
+        <p:nvSpPr>
+          <p:cNvPr id="4" name="Content Placeholder 2">
+            <a:extLst>
+              <a:ext uri="{FF2B5EF4-FFF2-40B4-BE49-F238E27FC236}">
+                <a16:creationId xmlns:a16="http://schemas.microsoft.com/office/drawing/2014/main" id="{1CA3E0FE-A404-4805-8384-F4DB772A6840}"/>
+              </a:ext>
+            </a:extLst>
+          </p:cNvPr>
+          <p:cNvSpPr txBox="1">
+            <a:spLocks/>
+          </p:cNvSpPr>
+          <p:nvPr/>
+        </p:nvSpPr>
+        <p:spPr>
+          <a:xfrm>
+            <a:off x="4406766" y="1075621"/>
+            <a:ext cx="3378468" cy="5417252"/>
+          </a:xfrm>
+          <a:prstGeom prst="rect">
+            <a:avLst/>
+          </a:prstGeom>
+          <a:ln>
+            <a:solidFill>
+              <a:schemeClr val="tx1"/>
+            </a:solidFill>
+          </a:ln>
+        </p:spPr>
+        <p:txBody>
+          <a:bodyPr vert="horz" lIns="91440" tIns="45720" rIns="91440" bIns="45720" rtlCol="0">
+            <a:normAutofit/>
+          </a:bodyPr>
+          <a:lstStyle>
+            <a:lvl1pPr marL="228600" indent="-228600" algn="l" defTabSz="914400" rtl="0" eaLnBrk="1" latinLnBrk="0" hangingPunct="1">
+              <a:lnSpc>
+                <a:spcPct val="90000"/>
+              </a:lnSpc>
+              <a:spcBef>
+                <a:spcPts val="1000"/>
+              </a:spcBef>
+              <a:buFont typeface="Arial" panose="020B0604020202020204" pitchFamily="34" charset="0"/>
+              <a:buChar char="•"/>
+              <a:defRPr sz="2800" kern="1200">
+                <a:solidFill>
+                  <a:schemeClr val="tx1"/>
+                </a:solidFill>
+                <a:latin typeface="+mn-lt"/>
+                <a:ea typeface="+mn-ea"/>
+                <a:cs typeface="+mn-cs"/>
+              </a:defRPr>
+            </a:lvl1pPr>
+            <a:lvl2pPr marL="685800" indent="-228600" algn="l" defTabSz="914400" rtl="0" eaLnBrk="1" latinLnBrk="0" hangingPunct="1">
+              <a:lnSpc>
+                <a:spcPct val="90000"/>
+              </a:lnSpc>
+              <a:spcBef>
+                <a:spcPts val="500"/>
+              </a:spcBef>
+              <a:buFont typeface="Arial" panose="020B0604020202020204" pitchFamily="34" charset="0"/>
+              <a:buChar char="•"/>
+              <a:defRPr sz="2400" kern="1200">
+                <a:solidFill>
+                  <a:schemeClr val="tx1"/>
+                </a:solidFill>
+                <a:latin typeface="+mn-lt"/>
+                <a:ea typeface="+mn-ea"/>
+                <a:cs typeface="+mn-cs"/>
+              </a:defRPr>
+            </a:lvl2pPr>
+            <a:lvl3pPr marL="1143000" indent="-228600" algn="l" defTabSz="914400" rtl="0" eaLnBrk="1" latinLnBrk="0" hangingPunct="1">
+              <a:lnSpc>
+                <a:spcPct val="90000"/>
+              </a:lnSpc>
+              <a:spcBef>
+                <a:spcPts val="500"/>
+              </a:spcBef>
+              <a:buFont typeface="Arial" panose="020B0604020202020204" pitchFamily="34" charset="0"/>
+              <a:buChar char="•"/>
+              <a:defRPr sz="2000" kern="1200">
+                <a:solidFill>
+                  <a:schemeClr val="tx1"/>
+                </a:solidFill>
+                <a:latin typeface="+mn-lt"/>
+                <a:ea typeface="+mn-ea"/>
+                <a:cs typeface="+mn-cs"/>
+              </a:defRPr>
+            </a:lvl3pPr>
+            <a:lvl4pPr marL="1600200" indent="-228600" algn="l" defTabSz="914400" rtl="0" eaLnBrk="1" latinLnBrk="0" hangingPunct="1">
+              <a:lnSpc>
+                <a:spcPct val="90000"/>
+              </a:lnSpc>
+              <a:spcBef>
+                <a:spcPts val="500"/>
+              </a:spcBef>
+              <a:buFont typeface="Arial" panose="020B0604020202020204" pitchFamily="34" charset="0"/>
+              <a:buChar char="•"/>
+              <a:defRPr sz="1800" kern="1200">
+                <a:solidFill>
+                  <a:schemeClr val="tx1"/>
+                </a:solidFill>
+                <a:latin typeface="+mn-lt"/>
+                <a:ea typeface="+mn-ea"/>
+                <a:cs typeface="+mn-cs"/>
+              </a:defRPr>
+            </a:lvl4pPr>
+            <a:lvl5pPr marL="2057400" indent="-228600" algn="l" defTabSz="914400" rtl="0" eaLnBrk="1" latinLnBrk="0" hangingPunct="1">
+              <a:lnSpc>
+                <a:spcPct val="90000"/>
+              </a:lnSpc>
+              <a:spcBef>
+                <a:spcPts val="500"/>
+              </a:spcBef>
+              <a:buFont typeface="Arial" panose="020B0604020202020204" pitchFamily="34" charset="0"/>
+              <a:buChar char="•"/>
+              <a:defRPr sz="1800" kern="1200">
+                <a:solidFill>
+                  <a:schemeClr val="tx1"/>
+                </a:solidFill>
+                <a:latin typeface="+mn-lt"/>
+                <a:ea typeface="+mn-ea"/>
+                <a:cs typeface="+mn-cs"/>
+              </a:defRPr>
+            </a:lvl5pPr>
+            <a:lvl6pPr marL="2514600" indent="-228600" algn="l" defTabSz="914400" rtl="0" eaLnBrk="1" latinLnBrk="0" hangingPunct="1">
+              <a:lnSpc>
+                <a:spcPct val="90000"/>
+              </a:lnSpc>
+              <a:spcBef>
+                <a:spcPts val="500"/>
+              </a:spcBef>
+              <a:buFont typeface="Arial" panose="020B0604020202020204" pitchFamily="34" charset="0"/>
+              <a:buChar char="•"/>
+              <a:defRPr sz="1800" kern="1200">
+                <a:solidFill>
+                  <a:schemeClr val="tx1"/>
+                </a:solidFill>
+                <a:latin typeface="+mn-lt"/>
+                <a:ea typeface="+mn-ea"/>
+                <a:cs typeface="+mn-cs"/>
+              </a:defRPr>
+            </a:lvl6pPr>
+            <a:lvl7pPr marL="2971800" indent="-228600" algn="l" defTabSz="914400" rtl="0" eaLnBrk="1" latinLnBrk="0" hangingPunct="1">
+              <a:lnSpc>
+                <a:spcPct val="90000"/>
+              </a:lnSpc>
+              <a:spcBef>
+                <a:spcPts val="500"/>
+              </a:spcBef>
+              <a:buFont typeface="Arial" panose="020B0604020202020204" pitchFamily="34" charset="0"/>
+              <a:buChar char="•"/>
+              <a:defRPr sz="1800" kern="1200">
+                <a:solidFill>
+                  <a:schemeClr val="tx1"/>
+                </a:solidFill>
+                <a:latin typeface="+mn-lt"/>
+                <a:ea typeface="+mn-ea"/>
+                <a:cs typeface="+mn-cs"/>
+              </a:defRPr>
+            </a:lvl7pPr>
+            <a:lvl8pPr marL="3429000" indent="-228600" algn="l" defTabSz="914400" rtl="0" eaLnBrk="1" latinLnBrk="0" hangingPunct="1">
+              <a:lnSpc>
+                <a:spcPct val="90000"/>
+              </a:lnSpc>
+              <a:spcBef>
+                <a:spcPts val="500"/>
+              </a:spcBef>
+              <a:buFont typeface="Arial" panose="020B0604020202020204" pitchFamily="34" charset="0"/>
+              <a:buChar char="•"/>
+              <a:defRPr sz="1800" kern="1200">
+                <a:solidFill>
+                  <a:schemeClr val="tx1"/>
+                </a:solidFill>
+                <a:latin typeface="+mn-lt"/>
+                <a:ea typeface="+mn-ea"/>
+                <a:cs typeface="+mn-cs"/>
+              </a:defRPr>
+            </a:lvl8pPr>
+            <a:lvl9pPr marL="3886200" indent="-228600" algn="l" defTabSz="914400" rtl="0" eaLnBrk="1" latinLnBrk="0" hangingPunct="1">
+              <a:lnSpc>
+                <a:spcPct val="90000"/>
+              </a:lnSpc>
+              <a:spcBef>
+                <a:spcPts val="500"/>
+              </a:spcBef>
+              <a:buFont typeface="Arial" panose="020B0604020202020204" pitchFamily="34" charset="0"/>
+              <a:buChar char="•"/>
+              <a:defRPr sz="1800" kern="1200">
+                <a:solidFill>
+                  <a:schemeClr val="tx1"/>
+                </a:solidFill>
+                <a:latin typeface="+mn-lt"/>
+                <a:ea typeface="+mn-ea"/>
+                <a:cs typeface="+mn-cs"/>
+              </a:defRPr>
+            </a:lvl9pPr>
+          </a:lstStyle>
+          <a:p>
+            <a:pPr marL="0" indent="0" algn="ctr">
+              <a:buNone/>
+            </a:pPr>
+            <a:r>
+              <a:rPr lang="en-US" dirty="0"/>
+              <a:t>VISUALIZATION</a:t>
+            </a:r>
+          </a:p>
+        </p:txBody>
+      </p:sp>
+      <p:sp>
+        <p:nvSpPr>
+          <p:cNvPr id="5" name="Content Placeholder 2">
+            <a:extLst>
+              <a:ext uri="{FF2B5EF4-FFF2-40B4-BE49-F238E27FC236}">
+                <a16:creationId xmlns:a16="http://schemas.microsoft.com/office/drawing/2014/main" id="{BB844202-ACD3-47B1-943C-656C576C9E89}"/>
+              </a:ext>
+            </a:extLst>
+          </p:cNvPr>
+          <p:cNvSpPr txBox="1">
+            <a:spLocks/>
+          </p:cNvSpPr>
+          <p:nvPr/>
+        </p:nvSpPr>
+        <p:spPr>
+          <a:xfrm>
+            <a:off x="8707653" y="1075621"/>
+            <a:ext cx="3378468" cy="5417252"/>
+          </a:xfrm>
+          <a:prstGeom prst="rect">
+            <a:avLst/>
+          </a:prstGeom>
+          <a:ln>
+            <a:solidFill>
+              <a:schemeClr val="tx1"/>
+            </a:solidFill>
+          </a:ln>
+        </p:spPr>
+        <p:txBody>
+          <a:bodyPr vert="horz" lIns="91440" tIns="45720" rIns="91440" bIns="45720" rtlCol="0">
+            <a:normAutofit/>
+          </a:bodyPr>
+          <a:lstStyle>
+            <a:lvl1pPr marL="228600" indent="-228600" algn="l" defTabSz="914400" rtl="0" eaLnBrk="1" latinLnBrk="0" hangingPunct="1">
+              <a:lnSpc>
+                <a:spcPct val="90000"/>
+              </a:lnSpc>
+              <a:spcBef>
+                <a:spcPts val="1000"/>
+              </a:spcBef>
+              <a:buFont typeface="Arial" panose="020B0604020202020204" pitchFamily="34" charset="0"/>
+              <a:buChar char="•"/>
+              <a:defRPr sz="2800" kern="1200">
+                <a:solidFill>
+                  <a:schemeClr val="tx1"/>
+                </a:solidFill>
+                <a:latin typeface="+mn-lt"/>
+                <a:ea typeface="+mn-ea"/>
+                <a:cs typeface="+mn-cs"/>
+              </a:defRPr>
+            </a:lvl1pPr>
+            <a:lvl2pPr marL="685800" indent="-228600" algn="l" defTabSz="914400" rtl="0" eaLnBrk="1" latinLnBrk="0" hangingPunct="1">
+              <a:lnSpc>
+                <a:spcPct val="90000"/>
+              </a:lnSpc>
+              <a:spcBef>
+                <a:spcPts val="500"/>
+              </a:spcBef>
+              <a:buFont typeface="Arial" panose="020B0604020202020204" pitchFamily="34" charset="0"/>
+              <a:buChar char="•"/>
+              <a:defRPr sz="2400" kern="1200">
+                <a:solidFill>
+                  <a:schemeClr val="tx1"/>
+                </a:solidFill>
+                <a:latin typeface="+mn-lt"/>
+                <a:ea typeface="+mn-ea"/>
+                <a:cs typeface="+mn-cs"/>
+              </a:defRPr>
+            </a:lvl2pPr>
+            <a:lvl3pPr marL="1143000" indent="-228600" algn="l" defTabSz="914400" rtl="0" eaLnBrk="1" latinLnBrk="0" hangingPunct="1">
+              <a:lnSpc>
+                <a:spcPct val="90000"/>
+              </a:lnSpc>
+              <a:spcBef>
+                <a:spcPts val="500"/>
+              </a:spcBef>
+              <a:buFont typeface="Arial" panose="020B0604020202020204" pitchFamily="34" charset="0"/>
+              <a:buChar char="•"/>
+              <a:defRPr sz="2000" kern="1200">
+                <a:solidFill>
+                  <a:schemeClr val="tx1"/>
+                </a:solidFill>
+                <a:latin typeface="+mn-lt"/>
+                <a:ea typeface="+mn-ea"/>
+                <a:cs typeface="+mn-cs"/>
+              </a:defRPr>
+            </a:lvl3pPr>
+            <a:lvl4pPr marL="1600200" indent="-228600" algn="l" defTabSz="914400" rtl="0" eaLnBrk="1" latinLnBrk="0" hangingPunct="1">
+              <a:lnSpc>
+                <a:spcPct val="90000"/>
+              </a:lnSpc>
+              <a:spcBef>
+                <a:spcPts val="500"/>
+              </a:spcBef>
+              <a:buFont typeface="Arial" panose="020B0604020202020204" pitchFamily="34" charset="0"/>
+              <a:buChar char="•"/>
+              <a:defRPr sz="1800" kern="1200">
+                <a:solidFill>
+                  <a:schemeClr val="tx1"/>
+                </a:solidFill>
+                <a:latin typeface="+mn-lt"/>
+                <a:ea typeface="+mn-ea"/>
+                <a:cs typeface="+mn-cs"/>
+              </a:defRPr>
+            </a:lvl4pPr>
+            <a:lvl5pPr marL="2057400" indent="-228600" algn="l" defTabSz="914400" rtl="0" eaLnBrk="1" latinLnBrk="0" hangingPunct="1">
+              <a:lnSpc>
+                <a:spcPct val="90000"/>
+              </a:lnSpc>
+              <a:spcBef>
+                <a:spcPts val="500"/>
+              </a:spcBef>
+              <a:buFont typeface="Arial" panose="020B0604020202020204" pitchFamily="34" charset="0"/>
+              <a:buChar char="•"/>
+              <a:defRPr sz="1800" kern="1200">
+                <a:solidFill>
+                  <a:schemeClr val="tx1"/>
+                </a:solidFill>
+                <a:latin typeface="+mn-lt"/>
+                <a:ea typeface="+mn-ea"/>
+                <a:cs typeface="+mn-cs"/>
+              </a:defRPr>
+            </a:lvl5pPr>
+            <a:lvl6pPr marL="2514600" indent="-228600" algn="l" defTabSz="914400" rtl="0" eaLnBrk="1" latinLnBrk="0" hangingPunct="1">
+              <a:lnSpc>
+                <a:spcPct val="90000"/>
+              </a:lnSpc>
+              <a:spcBef>
+                <a:spcPts val="500"/>
+              </a:spcBef>
+              <a:buFont typeface="Arial" panose="020B0604020202020204" pitchFamily="34" charset="0"/>
+              <a:buChar char="•"/>
+              <a:defRPr sz="1800" kern="1200">
+                <a:solidFill>
+                  <a:schemeClr val="tx1"/>
+                </a:solidFill>
+                <a:latin typeface="+mn-lt"/>
+                <a:ea typeface="+mn-ea"/>
+                <a:cs typeface="+mn-cs"/>
+              </a:defRPr>
+            </a:lvl6pPr>
+            <a:lvl7pPr marL="2971800" indent="-228600" algn="l" defTabSz="914400" rtl="0" eaLnBrk="1" latinLnBrk="0" hangingPunct="1">
+              <a:lnSpc>
+                <a:spcPct val="90000"/>
+              </a:lnSpc>
+              <a:spcBef>
+                <a:spcPts val="500"/>
+              </a:spcBef>
+              <a:buFont typeface="Arial" panose="020B0604020202020204" pitchFamily="34" charset="0"/>
+              <a:buChar char="•"/>
+              <a:defRPr sz="1800" kern="1200">
+                <a:solidFill>
+                  <a:schemeClr val="tx1"/>
+                </a:solidFill>
+                <a:latin typeface="+mn-lt"/>
+                <a:ea typeface="+mn-ea"/>
+                <a:cs typeface="+mn-cs"/>
+              </a:defRPr>
+            </a:lvl7pPr>
+            <a:lvl8pPr marL="3429000" indent="-228600" algn="l" defTabSz="914400" rtl="0" eaLnBrk="1" latinLnBrk="0" hangingPunct="1">
+              <a:lnSpc>
+                <a:spcPct val="90000"/>
+              </a:lnSpc>
+              <a:spcBef>
+                <a:spcPts val="500"/>
+              </a:spcBef>
+              <a:buFont typeface="Arial" panose="020B0604020202020204" pitchFamily="34" charset="0"/>
+              <a:buChar char="•"/>
+              <a:defRPr sz="1800" kern="1200">
+                <a:solidFill>
+                  <a:schemeClr val="tx1"/>
+                </a:solidFill>
+                <a:latin typeface="+mn-lt"/>
+                <a:ea typeface="+mn-ea"/>
+                <a:cs typeface="+mn-cs"/>
+              </a:defRPr>
+            </a:lvl8pPr>
+            <a:lvl9pPr marL="3886200" indent="-228600" algn="l" defTabSz="914400" rtl="0" eaLnBrk="1" latinLnBrk="0" hangingPunct="1">
+              <a:lnSpc>
+                <a:spcPct val="90000"/>
+              </a:lnSpc>
+              <a:spcBef>
+                <a:spcPts val="500"/>
+              </a:spcBef>
+              <a:buFont typeface="Arial" panose="020B0604020202020204" pitchFamily="34" charset="0"/>
+              <a:buChar char="•"/>
+              <a:defRPr sz="1800" kern="1200">
+                <a:solidFill>
+                  <a:schemeClr val="tx1"/>
+                </a:solidFill>
+                <a:latin typeface="+mn-lt"/>
+                <a:ea typeface="+mn-ea"/>
+                <a:cs typeface="+mn-cs"/>
+              </a:defRPr>
+            </a:lvl9pPr>
+          </a:lstStyle>
+          <a:p>
+            <a:pPr marL="0" indent="0" algn="ctr">
+              <a:buNone/>
+            </a:pPr>
+            <a:r>
+              <a:rPr lang="en-US" dirty="0"/>
+              <a:t>ANALYSIS</a:t>
+            </a:r>
+          </a:p>
+        </p:txBody>
+      </p:sp>
+      <p:cxnSp>
+        <p:nvCxnSpPr>
+          <p:cNvPr id="7" name="Straight Connector 6">
+            <a:extLst>
+              <a:ext uri="{FF2B5EF4-FFF2-40B4-BE49-F238E27FC236}">
+                <a16:creationId xmlns:a16="http://schemas.microsoft.com/office/drawing/2014/main" id="{AA5E1AE6-12DE-44B7-9E86-667AB34BC707}"/>
+              </a:ext>
+            </a:extLst>
+          </p:cNvPr>
+          <p:cNvCxnSpPr>
+            <a:cxnSpLocks/>
+          </p:cNvCxnSpPr>
+          <p:nvPr/>
+        </p:nvCxnSpPr>
+        <p:spPr>
+          <a:xfrm>
+            <a:off x="3946359" y="889134"/>
+            <a:ext cx="0" cy="5790225"/>
+          </a:xfrm>
+          <a:prstGeom prst="line">
+            <a:avLst/>
+          </a:prstGeom>
+          <a:ln w="38100">
+            <a:solidFill>
+              <a:schemeClr val="tx1"/>
+            </a:solidFill>
+          </a:ln>
+        </p:spPr>
+        <p:style>
+          <a:lnRef idx="1">
+            <a:schemeClr val="accent1"/>
+          </a:lnRef>
+          <a:fillRef idx="0">
+            <a:schemeClr val="accent1"/>
+          </a:fillRef>
+          <a:effectRef idx="0">
+            <a:schemeClr val="accent1"/>
+          </a:effectRef>
+          <a:fontRef idx="minor">
+            <a:schemeClr val="tx1"/>
+          </a:fontRef>
+        </p:style>
+      </p:cxnSp>
+      <p:cxnSp>
+        <p:nvCxnSpPr>
+          <p:cNvPr id="11" name="Straight Connector 10">
+            <a:extLst>
+              <a:ext uri="{FF2B5EF4-FFF2-40B4-BE49-F238E27FC236}">
+                <a16:creationId xmlns:a16="http://schemas.microsoft.com/office/drawing/2014/main" id="{6B497006-B5FE-49D1-8195-C602244D7A89}"/>
+              </a:ext>
+            </a:extLst>
+          </p:cNvPr>
+          <p:cNvCxnSpPr>
+            <a:cxnSpLocks/>
+          </p:cNvCxnSpPr>
+          <p:nvPr/>
+        </p:nvCxnSpPr>
+        <p:spPr>
+          <a:xfrm>
+            <a:off x="8247247" y="889134"/>
+            <a:ext cx="0" cy="5790225"/>
+          </a:xfrm>
+          <a:prstGeom prst="line">
+            <a:avLst/>
+          </a:prstGeom>
+          <a:ln w="38100">
+            <a:solidFill>
+              <a:schemeClr val="tx1"/>
+            </a:solidFill>
+          </a:ln>
+        </p:spPr>
+        <p:style>
+          <a:lnRef idx="1">
+            <a:schemeClr val="accent1"/>
+          </a:lnRef>
+          <a:fillRef idx="0">
+            <a:schemeClr val="accent1"/>
+          </a:fillRef>
+          <a:effectRef idx="0">
+            <a:schemeClr val="accent1"/>
+          </a:effectRef>
+          <a:fontRef idx="minor">
+            <a:schemeClr val="tx1"/>
+          </a:fontRef>
+        </p:style>
+      </p:cxnSp>
     </p:spTree>
     <p:extLst>
       <p:ext uri="{BB962C8B-B14F-4D97-AF65-F5344CB8AC3E}">
@@ -3975,7 +4504,7 @@
           <p:cNvPr id="2" name="Title 1">
             <a:extLst>
               <a:ext uri="{FF2B5EF4-FFF2-40B4-BE49-F238E27FC236}">
-                <a16:creationId xmlns:a16="http://schemas.microsoft.com/office/drawing/2014/main" id="{8D15B8FD-421A-4F16-8994-46A84B3B4F5E}"/>
+                <a16:creationId xmlns:a16="http://schemas.microsoft.com/office/drawing/2014/main" id="{22CA8328-6E6E-4B58-9BD2-B4E4D3777C0D}"/>
               </a:ext>
             </a:extLst>
           </p:cNvPr>
@@ -3986,14 +4515,27 @@
             <p:ph type="title"/>
           </p:nvPr>
         </p:nvSpPr>
-        <p:spPr/>
-        <p:txBody>
-          <a:bodyPr/>
-          <a:lstStyle/>
-          <a:p>
+        <p:spPr>
+          <a:xfrm>
+            <a:off x="838200" y="163000"/>
+            <a:ext cx="10515600" cy="568526"/>
+          </a:xfrm>
+          <a:ln w="28575">
+            <a:solidFill>
+              <a:schemeClr val="tx1"/>
+            </a:solidFill>
+          </a:ln>
+        </p:spPr>
+        <p:txBody>
+          <a:bodyPr>
+            <a:normAutofit fontScale="90000"/>
+          </a:bodyPr>
+          <a:lstStyle/>
+          <a:p>
+            <a:pPr algn="ctr"/>
             <a:r>
               <a:rPr lang="en-US" dirty="0"/>
-              <a:t>Some Snips of sample code</a:t>
+              <a:t>HEADER – TOPIC/QUESTION</a:t>
             </a:r>
           </a:p>
         </p:txBody>
@@ -4003,7 +4545,7 @@
           <p:cNvPr id="3" name="Content Placeholder 2">
             <a:extLst>
               <a:ext uri="{FF2B5EF4-FFF2-40B4-BE49-F238E27FC236}">
-                <a16:creationId xmlns:a16="http://schemas.microsoft.com/office/drawing/2014/main" id="{21F1BC7F-6AFF-459C-A618-B89F92C1F1C8}"/>
+                <a16:creationId xmlns:a16="http://schemas.microsoft.com/office/drawing/2014/main" id="{959E261A-2B13-4468-BDF8-ECE1331FFBCB}"/>
               </a:ext>
             </a:extLst>
           </p:cNvPr>
@@ -4014,19 +4556,535 @@
             <p:ph idx="1"/>
           </p:nvPr>
         </p:nvSpPr>
-        <p:spPr/>
-        <p:txBody>
-          <a:bodyPr/>
-          <a:lstStyle/>
-          <a:p>
-            <a:endParaRPr lang="en-US"/>
-          </a:p>
-        </p:txBody>
-      </p:sp>
+        <p:spPr>
+          <a:xfrm>
+            <a:off x="105879" y="1075621"/>
+            <a:ext cx="3378468" cy="5417252"/>
+          </a:xfrm>
+          <a:ln>
+            <a:solidFill>
+              <a:schemeClr val="tx1"/>
+            </a:solidFill>
+          </a:ln>
+        </p:spPr>
+        <p:txBody>
+          <a:bodyPr/>
+          <a:lstStyle/>
+          <a:p>
+            <a:pPr marL="0" indent="0" algn="ctr">
+              <a:buNone/>
+            </a:pPr>
+            <a:r>
+              <a:rPr lang="en-US" dirty="0"/>
+              <a:t>CODE IMAGE</a:t>
+            </a:r>
+          </a:p>
+        </p:txBody>
+      </p:sp>
+      <p:sp>
+        <p:nvSpPr>
+          <p:cNvPr id="4" name="Content Placeholder 2">
+            <a:extLst>
+              <a:ext uri="{FF2B5EF4-FFF2-40B4-BE49-F238E27FC236}">
+                <a16:creationId xmlns:a16="http://schemas.microsoft.com/office/drawing/2014/main" id="{1CA3E0FE-A404-4805-8384-F4DB772A6840}"/>
+              </a:ext>
+            </a:extLst>
+          </p:cNvPr>
+          <p:cNvSpPr txBox="1">
+            <a:spLocks/>
+          </p:cNvSpPr>
+          <p:nvPr/>
+        </p:nvSpPr>
+        <p:spPr>
+          <a:xfrm>
+            <a:off x="4264001" y="1075621"/>
+            <a:ext cx="7822069" cy="3583006"/>
+          </a:xfrm>
+          <a:prstGeom prst="rect">
+            <a:avLst/>
+          </a:prstGeom>
+          <a:ln>
+            <a:solidFill>
+              <a:schemeClr val="tx1"/>
+            </a:solidFill>
+          </a:ln>
+        </p:spPr>
+        <p:txBody>
+          <a:bodyPr vert="horz" lIns="91440" tIns="45720" rIns="91440" bIns="45720" rtlCol="0">
+            <a:normAutofit/>
+          </a:bodyPr>
+          <a:lstStyle>
+            <a:lvl1pPr marL="228600" indent="-228600" algn="l" defTabSz="914400" rtl="0" eaLnBrk="1" latinLnBrk="0" hangingPunct="1">
+              <a:lnSpc>
+                <a:spcPct val="90000"/>
+              </a:lnSpc>
+              <a:spcBef>
+                <a:spcPts val="1000"/>
+              </a:spcBef>
+              <a:buFont typeface="Arial" panose="020B0604020202020204" pitchFamily="34" charset="0"/>
+              <a:buChar char="•"/>
+              <a:defRPr sz="2800" kern="1200">
+                <a:solidFill>
+                  <a:schemeClr val="tx1"/>
+                </a:solidFill>
+                <a:latin typeface="+mn-lt"/>
+                <a:ea typeface="+mn-ea"/>
+                <a:cs typeface="+mn-cs"/>
+              </a:defRPr>
+            </a:lvl1pPr>
+            <a:lvl2pPr marL="685800" indent="-228600" algn="l" defTabSz="914400" rtl="0" eaLnBrk="1" latinLnBrk="0" hangingPunct="1">
+              <a:lnSpc>
+                <a:spcPct val="90000"/>
+              </a:lnSpc>
+              <a:spcBef>
+                <a:spcPts val="500"/>
+              </a:spcBef>
+              <a:buFont typeface="Arial" panose="020B0604020202020204" pitchFamily="34" charset="0"/>
+              <a:buChar char="•"/>
+              <a:defRPr sz="2400" kern="1200">
+                <a:solidFill>
+                  <a:schemeClr val="tx1"/>
+                </a:solidFill>
+                <a:latin typeface="+mn-lt"/>
+                <a:ea typeface="+mn-ea"/>
+                <a:cs typeface="+mn-cs"/>
+              </a:defRPr>
+            </a:lvl2pPr>
+            <a:lvl3pPr marL="1143000" indent="-228600" algn="l" defTabSz="914400" rtl="0" eaLnBrk="1" latinLnBrk="0" hangingPunct="1">
+              <a:lnSpc>
+                <a:spcPct val="90000"/>
+              </a:lnSpc>
+              <a:spcBef>
+                <a:spcPts val="500"/>
+              </a:spcBef>
+              <a:buFont typeface="Arial" panose="020B0604020202020204" pitchFamily="34" charset="0"/>
+              <a:buChar char="•"/>
+              <a:defRPr sz="2000" kern="1200">
+                <a:solidFill>
+                  <a:schemeClr val="tx1"/>
+                </a:solidFill>
+                <a:latin typeface="+mn-lt"/>
+                <a:ea typeface="+mn-ea"/>
+                <a:cs typeface="+mn-cs"/>
+              </a:defRPr>
+            </a:lvl3pPr>
+            <a:lvl4pPr marL="1600200" indent="-228600" algn="l" defTabSz="914400" rtl="0" eaLnBrk="1" latinLnBrk="0" hangingPunct="1">
+              <a:lnSpc>
+                <a:spcPct val="90000"/>
+              </a:lnSpc>
+              <a:spcBef>
+                <a:spcPts val="500"/>
+              </a:spcBef>
+              <a:buFont typeface="Arial" panose="020B0604020202020204" pitchFamily="34" charset="0"/>
+              <a:buChar char="•"/>
+              <a:defRPr sz="1800" kern="1200">
+                <a:solidFill>
+                  <a:schemeClr val="tx1"/>
+                </a:solidFill>
+                <a:latin typeface="+mn-lt"/>
+                <a:ea typeface="+mn-ea"/>
+                <a:cs typeface="+mn-cs"/>
+              </a:defRPr>
+            </a:lvl4pPr>
+            <a:lvl5pPr marL="2057400" indent="-228600" algn="l" defTabSz="914400" rtl="0" eaLnBrk="1" latinLnBrk="0" hangingPunct="1">
+              <a:lnSpc>
+                <a:spcPct val="90000"/>
+              </a:lnSpc>
+              <a:spcBef>
+                <a:spcPts val="500"/>
+              </a:spcBef>
+              <a:buFont typeface="Arial" panose="020B0604020202020204" pitchFamily="34" charset="0"/>
+              <a:buChar char="•"/>
+              <a:defRPr sz="1800" kern="1200">
+                <a:solidFill>
+                  <a:schemeClr val="tx1"/>
+                </a:solidFill>
+                <a:latin typeface="+mn-lt"/>
+                <a:ea typeface="+mn-ea"/>
+                <a:cs typeface="+mn-cs"/>
+              </a:defRPr>
+            </a:lvl5pPr>
+            <a:lvl6pPr marL="2514600" indent="-228600" algn="l" defTabSz="914400" rtl="0" eaLnBrk="1" latinLnBrk="0" hangingPunct="1">
+              <a:lnSpc>
+                <a:spcPct val="90000"/>
+              </a:lnSpc>
+              <a:spcBef>
+                <a:spcPts val="500"/>
+              </a:spcBef>
+              <a:buFont typeface="Arial" panose="020B0604020202020204" pitchFamily="34" charset="0"/>
+              <a:buChar char="•"/>
+              <a:defRPr sz="1800" kern="1200">
+                <a:solidFill>
+                  <a:schemeClr val="tx1"/>
+                </a:solidFill>
+                <a:latin typeface="+mn-lt"/>
+                <a:ea typeface="+mn-ea"/>
+                <a:cs typeface="+mn-cs"/>
+              </a:defRPr>
+            </a:lvl6pPr>
+            <a:lvl7pPr marL="2971800" indent="-228600" algn="l" defTabSz="914400" rtl="0" eaLnBrk="1" latinLnBrk="0" hangingPunct="1">
+              <a:lnSpc>
+                <a:spcPct val="90000"/>
+              </a:lnSpc>
+              <a:spcBef>
+                <a:spcPts val="500"/>
+              </a:spcBef>
+              <a:buFont typeface="Arial" panose="020B0604020202020204" pitchFamily="34" charset="0"/>
+              <a:buChar char="•"/>
+              <a:defRPr sz="1800" kern="1200">
+                <a:solidFill>
+                  <a:schemeClr val="tx1"/>
+                </a:solidFill>
+                <a:latin typeface="+mn-lt"/>
+                <a:ea typeface="+mn-ea"/>
+                <a:cs typeface="+mn-cs"/>
+              </a:defRPr>
+            </a:lvl7pPr>
+            <a:lvl8pPr marL="3429000" indent="-228600" algn="l" defTabSz="914400" rtl="0" eaLnBrk="1" latinLnBrk="0" hangingPunct="1">
+              <a:lnSpc>
+                <a:spcPct val="90000"/>
+              </a:lnSpc>
+              <a:spcBef>
+                <a:spcPts val="500"/>
+              </a:spcBef>
+              <a:buFont typeface="Arial" panose="020B0604020202020204" pitchFamily="34" charset="0"/>
+              <a:buChar char="•"/>
+              <a:defRPr sz="1800" kern="1200">
+                <a:solidFill>
+                  <a:schemeClr val="tx1"/>
+                </a:solidFill>
+                <a:latin typeface="+mn-lt"/>
+                <a:ea typeface="+mn-ea"/>
+                <a:cs typeface="+mn-cs"/>
+              </a:defRPr>
+            </a:lvl8pPr>
+            <a:lvl9pPr marL="3886200" indent="-228600" algn="l" defTabSz="914400" rtl="0" eaLnBrk="1" latinLnBrk="0" hangingPunct="1">
+              <a:lnSpc>
+                <a:spcPct val="90000"/>
+              </a:lnSpc>
+              <a:spcBef>
+                <a:spcPts val="500"/>
+              </a:spcBef>
+              <a:buFont typeface="Arial" panose="020B0604020202020204" pitchFamily="34" charset="0"/>
+              <a:buChar char="•"/>
+              <a:defRPr sz="1800" kern="1200">
+                <a:solidFill>
+                  <a:schemeClr val="tx1"/>
+                </a:solidFill>
+                <a:latin typeface="+mn-lt"/>
+                <a:ea typeface="+mn-ea"/>
+                <a:cs typeface="+mn-cs"/>
+              </a:defRPr>
+            </a:lvl9pPr>
+          </a:lstStyle>
+          <a:p>
+            <a:pPr marL="0" indent="0" algn="ctr">
+              <a:buNone/>
+            </a:pPr>
+            <a:r>
+              <a:rPr lang="en-US" dirty="0"/>
+              <a:t>VISUALIZATION</a:t>
+            </a:r>
+          </a:p>
+        </p:txBody>
+      </p:sp>
+      <p:sp>
+        <p:nvSpPr>
+          <p:cNvPr id="5" name="Content Placeholder 2">
+            <a:extLst>
+              <a:ext uri="{FF2B5EF4-FFF2-40B4-BE49-F238E27FC236}">
+                <a16:creationId xmlns:a16="http://schemas.microsoft.com/office/drawing/2014/main" id="{BB844202-ACD3-47B1-943C-656C576C9E89}"/>
+              </a:ext>
+            </a:extLst>
+          </p:cNvPr>
+          <p:cNvSpPr txBox="1">
+            <a:spLocks/>
+          </p:cNvSpPr>
+          <p:nvPr/>
+        </p:nvSpPr>
+        <p:spPr>
+          <a:xfrm>
+            <a:off x="4264052" y="5313145"/>
+            <a:ext cx="7822069" cy="1179728"/>
+          </a:xfrm>
+          <a:prstGeom prst="rect">
+            <a:avLst/>
+          </a:prstGeom>
+          <a:ln>
+            <a:solidFill>
+              <a:schemeClr val="tx1"/>
+            </a:solidFill>
+          </a:ln>
+        </p:spPr>
+        <p:txBody>
+          <a:bodyPr vert="horz" lIns="91440" tIns="45720" rIns="91440" bIns="45720" rtlCol="0">
+            <a:normAutofit/>
+          </a:bodyPr>
+          <a:lstStyle>
+            <a:lvl1pPr marL="228600" indent="-228600" algn="l" defTabSz="914400" rtl="0" eaLnBrk="1" latinLnBrk="0" hangingPunct="1">
+              <a:lnSpc>
+                <a:spcPct val="90000"/>
+              </a:lnSpc>
+              <a:spcBef>
+                <a:spcPts val="1000"/>
+              </a:spcBef>
+              <a:buFont typeface="Arial" panose="020B0604020202020204" pitchFamily="34" charset="0"/>
+              <a:buChar char="•"/>
+              <a:defRPr sz="2800" kern="1200">
+                <a:solidFill>
+                  <a:schemeClr val="tx1"/>
+                </a:solidFill>
+                <a:latin typeface="+mn-lt"/>
+                <a:ea typeface="+mn-ea"/>
+                <a:cs typeface="+mn-cs"/>
+              </a:defRPr>
+            </a:lvl1pPr>
+            <a:lvl2pPr marL="685800" indent="-228600" algn="l" defTabSz="914400" rtl="0" eaLnBrk="1" latinLnBrk="0" hangingPunct="1">
+              <a:lnSpc>
+                <a:spcPct val="90000"/>
+              </a:lnSpc>
+              <a:spcBef>
+                <a:spcPts val="500"/>
+              </a:spcBef>
+              <a:buFont typeface="Arial" panose="020B0604020202020204" pitchFamily="34" charset="0"/>
+              <a:buChar char="•"/>
+              <a:defRPr sz="2400" kern="1200">
+                <a:solidFill>
+                  <a:schemeClr val="tx1"/>
+                </a:solidFill>
+                <a:latin typeface="+mn-lt"/>
+                <a:ea typeface="+mn-ea"/>
+                <a:cs typeface="+mn-cs"/>
+              </a:defRPr>
+            </a:lvl2pPr>
+            <a:lvl3pPr marL="1143000" indent="-228600" algn="l" defTabSz="914400" rtl="0" eaLnBrk="1" latinLnBrk="0" hangingPunct="1">
+              <a:lnSpc>
+                <a:spcPct val="90000"/>
+              </a:lnSpc>
+              <a:spcBef>
+                <a:spcPts val="500"/>
+              </a:spcBef>
+              <a:buFont typeface="Arial" panose="020B0604020202020204" pitchFamily="34" charset="0"/>
+              <a:buChar char="•"/>
+              <a:defRPr sz="2000" kern="1200">
+                <a:solidFill>
+                  <a:schemeClr val="tx1"/>
+                </a:solidFill>
+                <a:latin typeface="+mn-lt"/>
+                <a:ea typeface="+mn-ea"/>
+                <a:cs typeface="+mn-cs"/>
+              </a:defRPr>
+            </a:lvl3pPr>
+            <a:lvl4pPr marL="1600200" indent="-228600" algn="l" defTabSz="914400" rtl="0" eaLnBrk="1" latinLnBrk="0" hangingPunct="1">
+              <a:lnSpc>
+                <a:spcPct val="90000"/>
+              </a:lnSpc>
+              <a:spcBef>
+                <a:spcPts val="500"/>
+              </a:spcBef>
+              <a:buFont typeface="Arial" panose="020B0604020202020204" pitchFamily="34" charset="0"/>
+              <a:buChar char="•"/>
+              <a:defRPr sz="1800" kern="1200">
+                <a:solidFill>
+                  <a:schemeClr val="tx1"/>
+                </a:solidFill>
+                <a:latin typeface="+mn-lt"/>
+                <a:ea typeface="+mn-ea"/>
+                <a:cs typeface="+mn-cs"/>
+              </a:defRPr>
+            </a:lvl4pPr>
+            <a:lvl5pPr marL="2057400" indent="-228600" algn="l" defTabSz="914400" rtl="0" eaLnBrk="1" latinLnBrk="0" hangingPunct="1">
+              <a:lnSpc>
+                <a:spcPct val="90000"/>
+              </a:lnSpc>
+              <a:spcBef>
+                <a:spcPts val="500"/>
+              </a:spcBef>
+              <a:buFont typeface="Arial" panose="020B0604020202020204" pitchFamily="34" charset="0"/>
+              <a:buChar char="•"/>
+              <a:defRPr sz="1800" kern="1200">
+                <a:solidFill>
+                  <a:schemeClr val="tx1"/>
+                </a:solidFill>
+                <a:latin typeface="+mn-lt"/>
+                <a:ea typeface="+mn-ea"/>
+                <a:cs typeface="+mn-cs"/>
+              </a:defRPr>
+            </a:lvl5pPr>
+            <a:lvl6pPr marL="2514600" indent="-228600" algn="l" defTabSz="914400" rtl="0" eaLnBrk="1" latinLnBrk="0" hangingPunct="1">
+              <a:lnSpc>
+                <a:spcPct val="90000"/>
+              </a:lnSpc>
+              <a:spcBef>
+                <a:spcPts val="500"/>
+              </a:spcBef>
+              <a:buFont typeface="Arial" panose="020B0604020202020204" pitchFamily="34" charset="0"/>
+              <a:buChar char="•"/>
+              <a:defRPr sz="1800" kern="1200">
+                <a:solidFill>
+                  <a:schemeClr val="tx1"/>
+                </a:solidFill>
+                <a:latin typeface="+mn-lt"/>
+                <a:ea typeface="+mn-ea"/>
+                <a:cs typeface="+mn-cs"/>
+              </a:defRPr>
+            </a:lvl6pPr>
+            <a:lvl7pPr marL="2971800" indent="-228600" algn="l" defTabSz="914400" rtl="0" eaLnBrk="1" latinLnBrk="0" hangingPunct="1">
+              <a:lnSpc>
+                <a:spcPct val="90000"/>
+              </a:lnSpc>
+              <a:spcBef>
+                <a:spcPts val="500"/>
+              </a:spcBef>
+              <a:buFont typeface="Arial" panose="020B0604020202020204" pitchFamily="34" charset="0"/>
+              <a:buChar char="•"/>
+              <a:defRPr sz="1800" kern="1200">
+                <a:solidFill>
+                  <a:schemeClr val="tx1"/>
+                </a:solidFill>
+                <a:latin typeface="+mn-lt"/>
+                <a:ea typeface="+mn-ea"/>
+                <a:cs typeface="+mn-cs"/>
+              </a:defRPr>
+            </a:lvl7pPr>
+            <a:lvl8pPr marL="3429000" indent="-228600" algn="l" defTabSz="914400" rtl="0" eaLnBrk="1" latinLnBrk="0" hangingPunct="1">
+              <a:lnSpc>
+                <a:spcPct val="90000"/>
+              </a:lnSpc>
+              <a:spcBef>
+                <a:spcPts val="500"/>
+              </a:spcBef>
+              <a:buFont typeface="Arial" panose="020B0604020202020204" pitchFamily="34" charset="0"/>
+              <a:buChar char="•"/>
+              <a:defRPr sz="1800" kern="1200">
+                <a:solidFill>
+                  <a:schemeClr val="tx1"/>
+                </a:solidFill>
+                <a:latin typeface="+mn-lt"/>
+                <a:ea typeface="+mn-ea"/>
+                <a:cs typeface="+mn-cs"/>
+              </a:defRPr>
+            </a:lvl8pPr>
+            <a:lvl9pPr marL="3886200" indent="-228600" algn="l" defTabSz="914400" rtl="0" eaLnBrk="1" latinLnBrk="0" hangingPunct="1">
+              <a:lnSpc>
+                <a:spcPct val="90000"/>
+              </a:lnSpc>
+              <a:spcBef>
+                <a:spcPts val="500"/>
+              </a:spcBef>
+              <a:buFont typeface="Arial" panose="020B0604020202020204" pitchFamily="34" charset="0"/>
+              <a:buChar char="•"/>
+              <a:defRPr sz="1800" kern="1200">
+                <a:solidFill>
+                  <a:schemeClr val="tx1"/>
+                </a:solidFill>
+                <a:latin typeface="+mn-lt"/>
+                <a:ea typeface="+mn-ea"/>
+                <a:cs typeface="+mn-cs"/>
+              </a:defRPr>
+            </a:lvl9pPr>
+          </a:lstStyle>
+          <a:p>
+            <a:pPr marL="0" indent="0" algn="ctr">
+              <a:buNone/>
+            </a:pPr>
+            <a:r>
+              <a:rPr lang="en-US" dirty="0"/>
+              <a:t>ANALYSIS</a:t>
+            </a:r>
+          </a:p>
+        </p:txBody>
+      </p:sp>
+      <p:cxnSp>
+        <p:nvCxnSpPr>
+          <p:cNvPr id="7" name="Straight Connector 6">
+            <a:extLst>
+              <a:ext uri="{FF2B5EF4-FFF2-40B4-BE49-F238E27FC236}">
+                <a16:creationId xmlns:a16="http://schemas.microsoft.com/office/drawing/2014/main" id="{AA5E1AE6-12DE-44B7-9E86-667AB34BC707}"/>
+              </a:ext>
+            </a:extLst>
+          </p:cNvPr>
+          <p:cNvCxnSpPr>
+            <a:cxnSpLocks/>
+          </p:cNvCxnSpPr>
+          <p:nvPr/>
+        </p:nvCxnSpPr>
+        <p:spPr>
+          <a:xfrm>
+            <a:off x="3946359" y="889134"/>
+            <a:ext cx="0" cy="5790225"/>
+          </a:xfrm>
+          <a:prstGeom prst="line">
+            <a:avLst/>
+          </a:prstGeom>
+          <a:ln w="38100">
+            <a:solidFill>
+              <a:schemeClr val="tx1"/>
+            </a:solidFill>
+          </a:ln>
+        </p:spPr>
+        <p:style>
+          <a:lnRef idx="1">
+            <a:schemeClr val="accent1"/>
+          </a:lnRef>
+          <a:fillRef idx="0">
+            <a:schemeClr val="accent1"/>
+          </a:fillRef>
+          <a:effectRef idx="0">
+            <a:schemeClr val="accent1"/>
+          </a:effectRef>
+          <a:fontRef idx="minor">
+            <a:schemeClr val="tx1"/>
+          </a:fontRef>
+        </p:style>
+      </p:cxnSp>
+      <p:cxnSp>
+        <p:nvCxnSpPr>
+          <p:cNvPr id="11" name="Straight Connector 10">
+            <a:extLst>
+              <a:ext uri="{FF2B5EF4-FFF2-40B4-BE49-F238E27FC236}">
+                <a16:creationId xmlns:a16="http://schemas.microsoft.com/office/drawing/2014/main" id="{6B497006-B5FE-49D1-8195-C602244D7A89}"/>
+              </a:ext>
+            </a:extLst>
+          </p:cNvPr>
+          <p:cNvCxnSpPr>
+            <a:cxnSpLocks/>
+          </p:cNvCxnSpPr>
+          <p:nvPr/>
+        </p:nvCxnSpPr>
+        <p:spPr>
+          <a:xfrm flipH="1">
+            <a:off x="6381549" y="4985887"/>
+            <a:ext cx="3723373" cy="0"/>
+          </a:xfrm>
+          <a:prstGeom prst="line">
+            <a:avLst/>
+          </a:prstGeom>
+          <a:ln w="38100">
+            <a:solidFill>
+              <a:schemeClr val="tx1"/>
+            </a:solidFill>
+          </a:ln>
+        </p:spPr>
+        <p:style>
+          <a:lnRef idx="1">
+            <a:schemeClr val="accent1"/>
+          </a:lnRef>
+          <a:fillRef idx="0">
+            <a:schemeClr val="accent1"/>
+          </a:fillRef>
+          <a:effectRef idx="0">
+            <a:schemeClr val="accent1"/>
+          </a:effectRef>
+          <a:fontRef idx="minor">
+            <a:schemeClr val="tx1"/>
+          </a:fontRef>
+        </p:style>
+      </p:cxnSp>
     </p:spTree>
     <p:extLst>
       <p:ext uri="{BB962C8B-B14F-4D97-AF65-F5344CB8AC3E}">
-        <p14:creationId xmlns:p14="http://schemas.microsoft.com/office/powerpoint/2010/main" val="1739574936"/>
+        <p14:creationId xmlns:p14="http://schemas.microsoft.com/office/powerpoint/2010/main" val="4000437216"/>
       </p:ext>
     </p:extLst>
   </p:cSld>

</xml_diff>

<commit_message>
Final Code and updated PPT deck
</commit_message>
<xml_diff>
--- a/CHADS_CODING/CRIME + NFL.pptx
+++ b/CHADS_CODING/CRIME + NFL.pptx
@@ -6,11 +6,10 @@
   </p:sldMasterIdLst>
   <p:sldIdLst>
     <p:sldId id="256" r:id="rId2"/>
-    <p:sldId id="257" r:id="rId3"/>
+    <p:sldId id="262" r:id="rId3"/>
     <p:sldId id="259" r:id="rId4"/>
     <p:sldId id="261" r:id="rId5"/>
     <p:sldId id="258" r:id="rId6"/>
-    <p:sldId id="262" r:id="rId7"/>
   </p:sldIdLst>
   <p:sldSz cx="12192000" cy="6858000"/>
   <p:notesSz cx="6858000" cy="9144000"/>
@@ -264,7 +263,7 @@
           <a:p>
             <a:fld id="{AEB1A662-EF76-44BE-8BB6-1C3AC9FAFF46}" type="datetimeFigureOut">
               <a:rPr lang="en-US" smtClean="0"/>
-              <a:t>2/1/2020</a:t>
+              <a:t>2/3/2020</a:t>
             </a:fld>
             <a:endParaRPr lang="en-US"/>
           </a:p>
@@ -462,7 +461,7 @@
           <a:p>
             <a:fld id="{AEB1A662-EF76-44BE-8BB6-1C3AC9FAFF46}" type="datetimeFigureOut">
               <a:rPr lang="en-US" smtClean="0"/>
-              <a:t>2/1/2020</a:t>
+              <a:t>2/3/2020</a:t>
             </a:fld>
             <a:endParaRPr lang="en-US"/>
           </a:p>
@@ -670,7 +669,7 @@
           <a:p>
             <a:fld id="{AEB1A662-EF76-44BE-8BB6-1C3AC9FAFF46}" type="datetimeFigureOut">
               <a:rPr lang="en-US" smtClean="0"/>
-              <a:t>2/1/2020</a:t>
+              <a:t>2/3/2020</a:t>
             </a:fld>
             <a:endParaRPr lang="en-US"/>
           </a:p>
@@ -868,7 +867,7 @@
           <a:p>
             <a:fld id="{AEB1A662-EF76-44BE-8BB6-1C3AC9FAFF46}" type="datetimeFigureOut">
               <a:rPr lang="en-US" smtClean="0"/>
-              <a:t>2/1/2020</a:t>
+              <a:t>2/3/2020</a:t>
             </a:fld>
             <a:endParaRPr lang="en-US"/>
           </a:p>
@@ -1143,7 +1142,7 @@
           <a:p>
             <a:fld id="{AEB1A662-EF76-44BE-8BB6-1C3AC9FAFF46}" type="datetimeFigureOut">
               <a:rPr lang="en-US" smtClean="0"/>
-              <a:t>2/1/2020</a:t>
+              <a:t>2/3/2020</a:t>
             </a:fld>
             <a:endParaRPr lang="en-US"/>
           </a:p>
@@ -1408,7 +1407,7 @@
           <a:p>
             <a:fld id="{AEB1A662-EF76-44BE-8BB6-1C3AC9FAFF46}" type="datetimeFigureOut">
               <a:rPr lang="en-US" smtClean="0"/>
-              <a:t>2/1/2020</a:t>
+              <a:t>2/3/2020</a:t>
             </a:fld>
             <a:endParaRPr lang="en-US"/>
           </a:p>
@@ -1820,7 +1819,7 @@
           <a:p>
             <a:fld id="{AEB1A662-EF76-44BE-8BB6-1C3AC9FAFF46}" type="datetimeFigureOut">
               <a:rPr lang="en-US" smtClean="0"/>
-              <a:t>2/1/2020</a:t>
+              <a:t>2/3/2020</a:t>
             </a:fld>
             <a:endParaRPr lang="en-US"/>
           </a:p>
@@ -1961,7 +1960,7 @@
           <a:p>
             <a:fld id="{AEB1A662-EF76-44BE-8BB6-1C3AC9FAFF46}" type="datetimeFigureOut">
               <a:rPr lang="en-US" smtClean="0"/>
-              <a:t>2/1/2020</a:t>
+              <a:t>2/3/2020</a:t>
             </a:fld>
             <a:endParaRPr lang="en-US"/>
           </a:p>
@@ -2074,7 +2073,7 @@
           <a:p>
             <a:fld id="{AEB1A662-EF76-44BE-8BB6-1C3AC9FAFF46}" type="datetimeFigureOut">
               <a:rPr lang="en-US" smtClean="0"/>
-              <a:t>2/1/2020</a:t>
+              <a:t>2/3/2020</a:t>
             </a:fld>
             <a:endParaRPr lang="en-US"/>
           </a:p>
@@ -2385,7 +2384,7 @@
           <a:p>
             <a:fld id="{AEB1A662-EF76-44BE-8BB6-1C3AC9FAFF46}" type="datetimeFigureOut">
               <a:rPr lang="en-US" smtClean="0"/>
-              <a:t>2/1/2020</a:t>
+              <a:t>2/3/2020</a:t>
             </a:fld>
             <a:endParaRPr lang="en-US"/>
           </a:p>
@@ -2673,7 +2672,7 @@
           <a:p>
             <a:fld id="{AEB1A662-EF76-44BE-8BB6-1C3AC9FAFF46}" type="datetimeFigureOut">
               <a:rPr lang="en-US" smtClean="0"/>
-              <a:t>2/1/2020</a:t>
+              <a:t>2/3/2020</a:t>
             </a:fld>
             <a:endParaRPr lang="en-US"/>
           </a:p>
@@ -2914,7 +2913,7 @@
           <a:p>
             <a:fld id="{AEB1A662-EF76-44BE-8BB6-1C3AC9FAFF46}" type="datetimeFigureOut">
               <a:rPr lang="en-US" smtClean="0"/>
-              <a:t>2/1/2020</a:t>
+              <a:t>2/3/2020</a:t>
             </a:fld>
             <a:endParaRPr lang="en-US"/>
           </a:p>
@@ -3428,7 +3427,7 @@
           <p:cNvPr id="2" name="Title 1">
             <a:extLst>
               <a:ext uri="{FF2B5EF4-FFF2-40B4-BE49-F238E27FC236}">
-                <a16:creationId xmlns:a16="http://schemas.microsoft.com/office/drawing/2014/main" id="{D912D42E-DD11-4719-BDA2-3320C153E696}"/>
+                <a16:creationId xmlns:a16="http://schemas.microsoft.com/office/drawing/2014/main" id="{22CA8328-6E6E-4B58-9BD2-B4E4D3777C0D}"/>
               </a:ext>
             </a:extLst>
           </p:cNvPr>
@@ -3439,378 +3438,11 @@
             <p:ph type="title"/>
           </p:nvPr>
         </p:nvSpPr>
-        <p:spPr/>
-        <p:txBody>
-          <a:bodyPr/>
-          <a:lstStyle/>
-          <a:p>
-            <a:r>
-              <a:rPr lang="en-US" dirty="0"/>
-              <a:t>MAP of Where Crimes Happens</a:t>
-            </a:r>
-          </a:p>
-        </p:txBody>
-      </p:sp>
-    </p:spTree>
-    <p:extLst>
-      <p:ext uri="{BB962C8B-B14F-4D97-AF65-F5344CB8AC3E}">
-        <p14:creationId xmlns:p14="http://schemas.microsoft.com/office/powerpoint/2010/main" val="2807851270"/>
-      </p:ext>
-    </p:extLst>
-  </p:cSld>
-  <p:clrMapOvr>
-    <a:masterClrMapping/>
-  </p:clrMapOvr>
-</p:sld>
-</file>
-
-<file path=ppt/slides/slide3.xml><?xml version="1.0" encoding="utf-8"?>
-<p:sld xmlns:a="http://schemas.openxmlformats.org/drawingml/2006/main" xmlns:r="http://schemas.openxmlformats.org/officeDocument/2006/relationships" xmlns:p="http://schemas.openxmlformats.org/presentationml/2006/main">
-  <p:cSld>
-    <p:spTree>
-      <p:nvGrpSpPr>
-        <p:cNvPr id="1" name=""/>
-        <p:cNvGrpSpPr/>
-        <p:nvPr/>
-      </p:nvGrpSpPr>
-      <p:grpSpPr>
-        <a:xfrm>
-          <a:off x="0" y="0"/>
-          <a:ext cx="0" cy="0"/>
-          <a:chOff x="0" y="0"/>
-          <a:chExt cx="0" cy="0"/>
-        </a:xfrm>
-      </p:grpSpPr>
-      <p:sp>
-        <p:nvSpPr>
-          <p:cNvPr id="2" name="Title 1">
-            <a:extLst>
-              <a:ext uri="{FF2B5EF4-FFF2-40B4-BE49-F238E27FC236}">
-                <a16:creationId xmlns:a16="http://schemas.microsoft.com/office/drawing/2014/main" id="{D74AEC38-734B-42CF-ACF7-CBF87E4A900E}"/>
-              </a:ext>
-            </a:extLst>
-          </p:cNvPr>
-          <p:cNvSpPr>
-            <a:spLocks noGrp="1"/>
-          </p:cNvSpPr>
-          <p:nvPr>
-            <p:ph type="title"/>
-          </p:nvPr>
-        </p:nvSpPr>
-        <p:spPr/>
-        <p:txBody>
-          <a:bodyPr/>
-          <a:lstStyle/>
-          <a:p>
-            <a:r>
-              <a:rPr lang="en-US" dirty="0"/>
-              <a:t>Line Graph of Total Crimes Per Year</a:t>
-            </a:r>
-          </a:p>
-        </p:txBody>
-      </p:sp>
-      <p:pic>
-        <p:nvPicPr>
-          <p:cNvPr id="5" name="Picture 4">
-            <a:extLst>
-              <a:ext uri="{FF2B5EF4-FFF2-40B4-BE49-F238E27FC236}">
-                <a16:creationId xmlns:a16="http://schemas.microsoft.com/office/drawing/2014/main" id="{1D1F6A4D-2361-4AA6-AAEE-6FA9566942A5}"/>
-              </a:ext>
-            </a:extLst>
-          </p:cNvPr>
-          <p:cNvPicPr>
-            <a:picLocks noChangeAspect="1"/>
-          </p:cNvPicPr>
-          <p:nvPr/>
-        </p:nvPicPr>
-        <p:blipFill>
-          <a:blip r:embed="rId2"/>
-          <a:stretch>
-            <a:fillRect/>
-          </a:stretch>
-        </p:blipFill>
         <p:spPr>
           <a:xfrm>
-            <a:off x="838200" y="1352145"/>
-            <a:ext cx="5447097" cy="2565338"/>
+            <a:off x="838200" y="163000"/>
+            <a:ext cx="10515600" cy="568526"/>
           </a:xfrm>
-          <a:prstGeom prst="rect">
-            <a:avLst/>
-          </a:prstGeom>
-          <a:ln>
-            <a:solidFill>
-              <a:schemeClr val="tx1"/>
-            </a:solidFill>
-          </a:ln>
-        </p:spPr>
-      </p:pic>
-      <p:sp>
-        <p:nvSpPr>
-          <p:cNvPr id="6" name="TextBox 5">
-            <a:extLst>
-              <a:ext uri="{FF2B5EF4-FFF2-40B4-BE49-F238E27FC236}">
-                <a16:creationId xmlns:a16="http://schemas.microsoft.com/office/drawing/2014/main" id="{0F04ACAD-C174-4953-957E-CC1CDC31B2CD}"/>
-              </a:ext>
-            </a:extLst>
-          </p:cNvPr>
-          <p:cNvSpPr txBox="1"/>
-          <p:nvPr/>
-        </p:nvSpPr>
-        <p:spPr>
-          <a:xfrm>
-            <a:off x="6862813" y="1352144"/>
-            <a:ext cx="4928134" cy="1200329"/>
-          </a:xfrm>
-          <a:prstGeom prst="rect">
-            <a:avLst/>
-          </a:prstGeom>
-          <a:noFill/>
-          <a:ln>
-            <a:solidFill>
-              <a:schemeClr val="tx1"/>
-            </a:solidFill>
-          </a:ln>
-        </p:spPr>
-        <p:txBody>
-          <a:bodyPr wrap="square" rtlCol="0">
-            <a:spAutoFit/>
-          </a:bodyPr>
-          <a:lstStyle/>
-          <a:p>
-            <a:r>
-              <a:rPr lang="en-US" dirty="0"/>
-              <a:t>Both offense and defense athletes are trending down from a total crimes committed</a:t>
-            </a:r>
-          </a:p>
-          <a:p>
-            <a:endParaRPr lang="en-US" dirty="0"/>
-          </a:p>
-          <a:p>
-            <a:r>
-              <a:rPr lang="en-US" dirty="0"/>
-              <a:t> </a:t>
-            </a:r>
-          </a:p>
-        </p:txBody>
-      </p:sp>
-      <p:pic>
-        <p:nvPicPr>
-          <p:cNvPr id="8" name="Picture 7">
-            <a:extLst>
-              <a:ext uri="{FF2B5EF4-FFF2-40B4-BE49-F238E27FC236}">
-                <a16:creationId xmlns:a16="http://schemas.microsoft.com/office/drawing/2014/main" id="{DDA2391C-B9E9-413E-B50B-4D30D5FC49AD}"/>
-              </a:ext>
-            </a:extLst>
-          </p:cNvPr>
-          <p:cNvPicPr>
-            <a:picLocks noChangeAspect="1"/>
-          </p:cNvPicPr>
-          <p:nvPr/>
-        </p:nvPicPr>
-        <p:blipFill>
-          <a:blip r:embed="rId3"/>
-          <a:stretch>
-            <a:fillRect/>
-          </a:stretch>
-        </p:blipFill>
-        <p:spPr>
-          <a:xfrm>
-            <a:off x="838200" y="4030750"/>
-            <a:ext cx="5447097" cy="2742857"/>
-          </a:xfrm>
-          <a:prstGeom prst="rect">
-            <a:avLst/>
-          </a:prstGeom>
-          <a:ln>
-            <a:solidFill>
-              <a:schemeClr val="tx1"/>
-            </a:solidFill>
-          </a:ln>
-        </p:spPr>
-      </p:pic>
-    </p:spTree>
-    <p:extLst>
-      <p:ext uri="{BB962C8B-B14F-4D97-AF65-F5344CB8AC3E}">
-        <p14:creationId xmlns:p14="http://schemas.microsoft.com/office/powerpoint/2010/main" val="1937582852"/>
-      </p:ext>
-    </p:extLst>
-  </p:cSld>
-  <p:clrMapOvr>
-    <a:masterClrMapping/>
-  </p:clrMapOvr>
-</p:sld>
-</file>
-
-<file path=ppt/slides/slide4.xml><?xml version="1.0" encoding="utf-8"?>
-<p:sld xmlns:a="http://schemas.openxmlformats.org/drawingml/2006/main" xmlns:r="http://schemas.openxmlformats.org/officeDocument/2006/relationships" xmlns:p="http://schemas.openxmlformats.org/presentationml/2006/main">
-  <p:cSld>
-    <p:spTree>
-      <p:nvGrpSpPr>
-        <p:cNvPr id="1" name=""/>
-        <p:cNvGrpSpPr/>
-        <p:nvPr/>
-      </p:nvGrpSpPr>
-      <p:grpSpPr>
-        <a:xfrm>
-          <a:off x="0" y="0"/>
-          <a:ext cx="0" cy="0"/>
-          <a:chOff x="0" y="0"/>
-          <a:chExt cx="0" cy="0"/>
-        </a:xfrm>
-      </p:grpSpPr>
-      <p:sp>
-        <p:nvSpPr>
-          <p:cNvPr id="2" name="Title 1">
-            <a:extLst>
-              <a:ext uri="{FF2B5EF4-FFF2-40B4-BE49-F238E27FC236}">
-                <a16:creationId xmlns:a16="http://schemas.microsoft.com/office/drawing/2014/main" id="{F8CCFD6C-1C4D-4FFD-BA4D-390E5F0E2313}"/>
-              </a:ext>
-            </a:extLst>
-          </p:cNvPr>
-          <p:cNvSpPr>
-            <a:spLocks noGrp="1"/>
-          </p:cNvSpPr>
-          <p:nvPr>
-            <p:ph type="title"/>
-          </p:nvPr>
-        </p:nvSpPr>
-        <p:spPr/>
-        <p:txBody>
-          <a:bodyPr/>
-          <a:lstStyle/>
-          <a:p>
-            <a:r>
-              <a:rPr lang="en-US" dirty="0"/>
-              <a:t>Pie Chart Crime by Offense or Defense</a:t>
-            </a:r>
-          </a:p>
-        </p:txBody>
-      </p:sp>
-      <p:pic>
-        <p:nvPicPr>
-          <p:cNvPr id="5" name="Picture 4">
-            <a:extLst>
-              <a:ext uri="{FF2B5EF4-FFF2-40B4-BE49-F238E27FC236}">
-                <a16:creationId xmlns:a16="http://schemas.microsoft.com/office/drawing/2014/main" id="{F82C2CB9-174C-4D93-8830-15335AB15D62}"/>
-              </a:ext>
-            </a:extLst>
-          </p:cNvPr>
-          <p:cNvPicPr>
-            <a:picLocks noChangeAspect="1"/>
-          </p:cNvPicPr>
-          <p:nvPr/>
-        </p:nvPicPr>
-        <p:blipFill>
-          <a:blip r:embed="rId2"/>
-          <a:stretch>
-            <a:fillRect/>
-          </a:stretch>
-        </p:blipFill>
-        <p:spPr>
-          <a:xfrm>
-            <a:off x="838200" y="1294599"/>
-            <a:ext cx="5609938" cy="2517006"/>
-          </a:xfrm>
-          <a:prstGeom prst="rect">
-            <a:avLst/>
-          </a:prstGeom>
-          <a:ln>
-            <a:solidFill>
-              <a:schemeClr val="tx1"/>
-            </a:solidFill>
-          </a:ln>
-        </p:spPr>
-      </p:pic>
-      <p:pic>
-        <p:nvPicPr>
-          <p:cNvPr id="6" name="Picture 5">
-            <a:extLst>
-              <a:ext uri="{FF2B5EF4-FFF2-40B4-BE49-F238E27FC236}">
-                <a16:creationId xmlns:a16="http://schemas.microsoft.com/office/drawing/2014/main" id="{2FBF5823-68D7-4F59-A03A-599ADE84CABD}"/>
-              </a:ext>
-            </a:extLst>
-          </p:cNvPr>
-          <p:cNvPicPr>
-            <a:picLocks noChangeAspect="1"/>
-          </p:cNvPicPr>
-          <p:nvPr/>
-        </p:nvPicPr>
-        <p:blipFill rotWithShape="1">
-          <a:blip r:embed="rId3"/>
-          <a:srcRect l="1398" t="2718" r="1880" b="3528"/>
-          <a:stretch/>
-        </p:blipFill>
-        <p:spPr>
-          <a:xfrm>
-            <a:off x="838200" y="4069980"/>
-            <a:ext cx="4100364" cy="2597656"/>
-          </a:xfrm>
-          <a:prstGeom prst="rect">
-            <a:avLst/>
-          </a:prstGeom>
-          <a:ln>
-            <a:solidFill>
-              <a:schemeClr val="tx1"/>
-            </a:solidFill>
-          </a:ln>
-        </p:spPr>
-      </p:pic>
-      <p:pic>
-        <p:nvPicPr>
-          <p:cNvPr id="7" name="Picture 6">
-            <a:extLst>
-              <a:ext uri="{FF2B5EF4-FFF2-40B4-BE49-F238E27FC236}">
-                <a16:creationId xmlns:a16="http://schemas.microsoft.com/office/drawing/2014/main" id="{80AACED5-878A-4863-BFE9-CE8FC921994D}"/>
-              </a:ext>
-            </a:extLst>
-          </p:cNvPr>
-          <p:cNvPicPr>
-            <a:picLocks noChangeAspect="1"/>
-          </p:cNvPicPr>
-          <p:nvPr/>
-        </p:nvPicPr>
-        <p:blipFill>
-          <a:blip r:embed="rId4"/>
-          <a:stretch>
-            <a:fillRect/>
-          </a:stretch>
-        </p:blipFill>
-        <p:spPr>
-          <a:xfrm>
-            <a:off x="6096000" y="4069980"/>
-            <a:ext cx="4100362" cy="2678246"/>
-          </a:xfrm>
-          <a:prstGeom prst="rect">
-            <a:avLst/>
-          </a:prstGeom>
-          <a:ln>
-            <a:solidFill>
-              <a:schemeClr val="tx1"/>
-            </a:solidFill>
-          </a:ln>
-        </p:spPr>
-      </p:pic>
-      <p:sp>
-        <p:nvSpPr>
-          <p:cNvPr id="8" name="TextBox 7">
-            <a:extLst>
-              <a:ext uri="{FF2B5EF4-FFF2-40B4-BE49-F238E27FC236}">
-                <a16:creationId xmlns:a16="http://schemas.microsoft.com/office/drawing/2014/main" id="{8713628E-DEDA-4BA8-80BD-767D9FC4B3D1}"/>
-              </a:ext>
-            </a:extLst>
-          </p:cNvPr>
-          <p:cNvSpPr txBox="1"/>
-          <p:nvPr/>
-        </p:nvSpPr>
-        <p:spPr>
-          <a:xfrm>
-            <a:off x="6939815" y="1294599"/>
-            <a:ext cx="4957010" cy="2585323"/>
-          </a:xfrm>
-          <a:prstGeom prst="rect">
-            <a:avLst/>
-          </a:prstGeom>
-          <a:noFill/>
           <a:ln w="12700">
             <a:solidFill>
               <a:schemeClr val="tx1"/>
@@ -3818,103 +3450,6 @@
           </a:ln>
         </p:spPr>
         <p:txBody>
-          <a:bodyPr wrap="square" rtlCol="0">
-            <a:spAutoFit/>
-          </a:bodyPr>
-          <a:lstStyle/>
-          <a:p>
-            <a:r>
-              <a:rPr lang="en-US" dirty="0"/>
-              <a:t>What do we learn about this?</a:t>
-            </a:r>
-          </a:p>
-          <a:p>
-            <a:endParaRPr lang="en-US" dirty="0"/>
-          </a:p>
-          <a:p>
-            <a:r>
-              <a:rPr lang="en-US" dirty="0"/>
-              <a:t>Defensive players have a greater % of crimes committed. </a:t>
-            </a:r>
-          </a:p>
-          <a:p>
-            <a:endParaRPr lang="en-US" dirty="0"/>
-          </a:p>
-          <a:p>
-            <a:r>
-              <a:rPr lang="en-US" dirty="0"/>
-              <a:t>What kind of Crimes are they committing?</a:t>
-            </a:r>
-          </a:p>
-          <a:p>
-            <a:endParaRPr lang="en-US" dirty="0"/>
-          </a:p>
-          <a:p>
-            <a:endParaRPr lang="en-US" dirty="0"/>
-          </a:p>
-          <a:p>
-            <a:endParaRPr lang="en-US" dirty="0"/>
-          </a:p>
-        </p:txBody>
-      </p:sp>
-    </p:spTree>
-    <p:extLst>
-      <p:ext uri="{BB962C8B-B14F-4D97-AF65-F5344CB8AC3E}">
-        <p14:creationId xmlns:p14="http://schemas.microsoft.com/office/powerpoint/2010/main" val="2678138440"/>
-      </p:ext>
-    </p:extLst>
-  </p:cSld>
-  <p:clrMapOvr>
-    <a:masterClrMapping/>
-  </p:clrMapOvr>
-</p:sld>
-</file>
-
-<file path=ppt/slides/slide5.xml><?xml version="1.0" encoding="utf-8"?>
-<p:sld xmlns:a="http://schemas.openxmlformats.org/drawingml/2006/main" xmlns:r="http://schemas.openxmlformats.org/officeDocument/2006/relationships" xmlns:p="http://schemas.openxmlformats.org/presentationml/2006/main">
-  <p:cSld>
-    <p:spTree>
-      <p:nvGrpSpPr>
-        <p:cNvPr id="1" name=""/>
-        <p:cNvGrpSpPr/>
-        <p:nvPr/>
-      </p:nvGrpSpPr>
-      <p:grpSpPr>
-        <a:xfrm>
-          <a:off x="0" y="0"/>
-          <a:ext cx="0" cy="0"/>
-          <a:chOff x="0" y="0"/>
-          <a:chExt cx="0" cy="0"/>
-        </a:xfrm>
-      </p:grpSpPr>
-      <p:sp>
-        <p:nvSpPr>
-          <p:cNvPr id="2" name="Title 1">
-            <a:extLst>
-              <a:ext uri="{FF2B5EF4-FFF2-40B4-BE49-F238E27FC236}">
-                <a16:creationId xmlns:a16="http://schemas.microsoft.com/office/drawing/2014/main" id="{22CA8328-6E6E-4B58-9BD2-B4E4D3777C0D}"/>
-              </a:ext>
-            </a:extLst>
-          </p:cNvPr>
-          <p:cNvSpPr>
-            <a:spLocks noGrp="1"/>
-          </p:cNvSpPr>
-          <p:nvPr>
-            <p:ph type="title"/>
-          </p:nvPr>
-        </p:nvSpPr>
-        <p:spPr>
-          <a:xfrm>
-            <a:off x="838200" y="163000"/>
-            <a:ext cx="10515600" cy="568526"/>
-          </a:xfrm>
-          <a:ln w="28575">
-            <a:solidFill>
-              <a:schemeClr val="tx1"/>
-            </a:solidFill>
-          </a:ln>
-        </p:spPr>
-        <p:txBody>
           <a:bodyPr>
             <a:normAutofit fontScale="90000"/>
           </a:bodyPr>
@@ -3923,7 +3458,7 @@
             <a:pPr algn="ctr"/>
             <a:r>
               <a:rPr lang="en-US" dirty="0"/>
-              <a:t>HEADER – TOPIC/QUESTION</a:t>
+              <a:t>HEAT MAP: TOTAL CRIMES BY TEAM</a:t>
             </a:r>
           </a:p>
         </p:txBody>
@@ -3946,8 +3481,8 @@
         </p:nvSpPr>
         <p:spPr>
           <a:xfrm>
-            <a:off x="105879" y="1075621"/>
-            <a:ext cx="3378468" cy="5417252"/>
+            <a:off x="105878" y="1075621"/>
+            <a:ext cx="3724972" cy="5417252"/>
           </a:xfrm>
           <a:ln>
             <a:solidFill>
@@ -3964,7 +3499,7 @@
             </a:pPr>
             <a:r>
               <a:rPr lang="en-US" dirty="0"/>
-              <a:t>CODE IMAGE</a:t>
+              <a:t>CODE</a:t>
             </a:r>
           </a:p>
         </p:txBody>
@@ -3985,8 +3520,8 @@
         </p:nvSpPr>
         <p:spPr>
           <a:xfrm>
-            <a:off x="4406766" y="1075621"/>
-            <a:ext cx="3378468" cy="5417252"/>
+            <a:off x="4061865" y="1075620"/>
+            <a:ext cx="8024206" cy="3650381"/>
           </a:xfrm>
           <a:prstGeom prst="rect">
             <a:avLst/>
@@ -4192,8 +3727,8 @@
         </p:nvSpPr>
         <p:spPr>
           <a:xfrm>
-            <a:off x="8707653" y="1075621"/>
-            <a:ext cx="3378468" cy="5417252"/>
+            <a:off x="4061866" y="4995524"/>
+            <a:ext cx="8024256" cy="1497349"/>
           </a:xfrm>
           <a:prstGeom prst="rect">
             <a:avLst/>
@@ -4381,6 +3916,30 @@
               <a:t>ANALYSIS</a:t>
             </a:r>
           </a:p>
+          <a:p>
+            <a:r>
+              <a:rPr lang="en-US" sz="1400" dirty="0"/>
+              <a:t>THE EAST COAST HAS THE MAJORITY OF THE CRIMES</a:t>
+            </a:r>
+          </a:p>
+          <a:p>
+            <a:r>
+              <a:rPr lang="en-US" sz="1400" dirty="0"/>
+              <a:t>MINNISOTA VIKINGS HAD THE MOST CRIMES OF ANY TEAM</a:t>
+            </a:r>
+          </a:p>
+          <a:p>
+            <a:r>
+              <a:rPr lang="en-US" sz="1400" dirty="0"/>
+              <a:t>HOUSTON TEXANS HAD THE FEWEST CRIMES OF ANY TEAM</a:t>
+            </a:r>
+          </a:p>
+          <a:p>
+            <a:endParaRPr lang="en-US" sz="1400" dirty="0"/>
+          </a:p>
+          <a:p>
+            <a:endParaRPr lang="en-US" dirty="0"/>
+          </a:p>
         </p:txBody>
       </p:sp>
       <p:cxnSp>
@@ -4441,9 +4000,9 @@
           <p:nvPr/>
         </p:nvCxnSpPr>
         <p:spPr>
-          <a:xfrm>
-            <a:off x="8247247" y="889134"/>
-            <a:ext cx="0" cy="5790225"/>
+          <a:xfrm flipH="1">
+            <a:off x="6381549" y="4860762"/>
+            <a:ext cx="3723373" cy="0"/>
           </a:xfrm>
           <a:prstGeom prst="line">
             <a:avLst/>
@@ -4469,10 +4028,80 @@
           </a:fontRef>
         </p:style>
       </p:cxnSp>
+      <p:pic>
+        <p:nvPicPr>
+          <p:cNvPr id="8" name="Picture 7">
+            <a:extLst>
+              <a:ext uri="{FF2B5EF4-FFF2-40B4-BE49-F238E27FC236}">
+                <a16:creationId xmlns:a16="http://schemas.microsoft.com/office/drawing/2014/main" id="{9F1DA9F1-B3BD-430D-8CA1-678F3DDF3B78}"/>
+              </a:ext>
+            </a:extLst>
+          </p:cNvPr>
+          <p:cNvPicPr>
+            <a:picLocks noChangeAspect="1"/>
+          </p:cNvPicPr>
+          <p:nvPr/>
+        </p:nvPicPr>
+        <p:blipFill>
+          <a:blip r:embed="rId2"/>
+          <a:stretch>
+            <a:fillRect/>
+          </a:stretch>
+        </p:blipFill>
+        <p:spPr>
+          <a:xfrm>
+            <a:off x="4215932" y="1530420"/>
+            <a:ext cx="7730626" cy="3128207"/>
+          </a:xfrm>
+          <a:prstGeom prst="rect">
+            <a:avLst/>
+          </a:prstGeom>
+          <a:ln>
+            <a:solidFill>
+              <a:schemeClr val="tx1"/>
+            </a:solidFill>
+          </a:ln>
+        </p:spPr>
+      </p:pic>
+      <p:pic>
+        <p:nvPicPr>
+          <p:cNvPr id="9" name="Picture 8">
+            <a:extLst>
+              <a:ext uri="{FF2B5EF4-FFF2-40B4-BE49-F238E27FC236}">
+                <a16:creationId xmlns:a16="http://schemas.microsoft.com/office/drawing/2014/main" id="{DA8F0354-4958-41FA-85A7-700F6170B2DC}"/>
+              </a:ext>
+            </a:extLst>
+          </p:cNvPr>
+          <p:cNvPicPr>
+            <a:picLocks noChangeAspect="1"/>
+          </p:cNvPicPr>
+          <p:nvPr/>
+        </p:nvPicPr>
+        <p:blipFill>
+          <a:blip r:embed="rId3"/>
+          <a:stretch>
+            <a:fillRect/>
+          </a:stretch>
+        </p:blipFill>
+        <p:spPr>
+          <a:xfrm>
+            <a:off x="187692" y="1530420"/>
+            <a:ext cx="3575785" cy="4889631"/>
+          </a:xfrm>
+          <a:prstGeom prst="rect">
+            <a:avLst/>
+          </a:prstGeom>
+          <a:ln>
+            <a:solidFill>
+              <a:schemeClr val="tx1"/>
+            </a:solidFill>
+          </a:ln>
+        </p:spPr>
+      </p:pic>
     </p:spTree>
     <p:extLst>
       <p:ext uri="{BB962C8B-B14F-4D97-AF65-F5344CB8AC3E}">
-        <p14:creationId xmlns:p14="http://schemas.microsoft.com/office/powerpoint/2010/main" val="3263429715"/>
+        <p14:creationId xmlns:p14="http://schemas.microsoft.com/office/powerpoint/2010/main" val="4000437216"/>
       </p:ext>
     </p:extLst>
   </p:cSld>
@@ -4482,7 +4111,7 @@
 </p:sld>
 </file>
 
-<file path=ppt/slides/slide6.xml><?xml version="1.0" encoding="utf-8"?>
+<file path=ppt/slides/slide3.xml><?xml version="1.0" encoding="utf-8"?>
 <p:sld xmlns:a="http://schemas.openxmlformats.org/drawingml/2006/main" xmlns:r="http://schemas.openxmlformats.org/officeDocument/2006/relationships" xmlns:p="http://schemas.openxmlformats.org/presentationml/2006/main">
   <p:cSld>
     <p:spTree>
@@ -4504,6 +4133,412 @@
           <p:cNvPr id="2" name="Title 1">
             <a:extLst>
               <a:ext uri="{FF2B5EF4-FFF2-40B4-BE49-F238E27FC236}">
+                <a16:creationId xmlns:a16="http://schemas.microsoft.com/office/drawing/2014/main" id="{D74AEC38-734B-42CF-ACF7-CBF87E4A900E}"/>
+              </a:ext>
+            </a:extLst>
+          </p:cNvPr>
+          <p:cNvSpPr>
+            <a:spLocks noGrp="1"/>
+          </p:cNvSpPr>
+          <p:nvPr>
+            <p:ph type="title"/>
+          </p:nvPr>
+        </p:nvSpPr>
+        <p:spPr/>
+        <p:txBody>
+          <a:bodyPr/>
+          <a:lstStyle/>
+          <a:p>
+            <a:r>
+              <a:rPr lang="en-US" dirty="0"/>
+              <a:t>Line Graph of Total Crimes Per Year</a:t>
+            </a:r>
+          </a:p>
+        </p:txBody>
+      </p:sp>
+      <p:pic>
+        <p:nvPicPr>
+          <p:cNvPr id="5" name="Picture 4">
+            <a:extLst>
+              <a:ext uri="{FF2B5EF4-FFF2-40B4-BE49-F238E27FC236}">
+                <a16:creationId xmlns:a16="http://schemas.microsoft.com/office/drawing/2014/main" id="{1D1F6A4D-2361-4AA6-AAEE-6FA9566942A5}"/>
+              </a:ext>
+            </a:extLst>
+          </p:cNvPr>
+          <p:cNvPicPr>
+            <a:picLocks noChangeAspect="1"/>
+          </p:cNvPicPr>
+          <p:nvPr/>
+        </p:nvPicPr>
+        <p:blipFill>
+          <a:blip r:embed="rId2"/>
+          <a:stretch>
+            <a:fillRect/>
+          </a:stretch>
+        </p:blipFill>
+        <p:spPr>
+          <a:xfrm>
+            <a:off x="838200" y="1352145"/>
+            <a:ext cx="5447097" cy="2565338"/>
+          </a:xfrm>
+          <a:prstGeom prst="rect">
+            <a:avLst/>
+          </a:prstGeom>
+          <a:ln>
+            <a:solidFill>
+              <a:schemeClr val="tx1"/>
+            </a:solidFill>
+          </a:ln>
+        </p:spPr>
+      </p:pic>
+      <p:sp>
+        <p:nvSpPr>
+          <p:cNvPr id="6" name="TextBox 5">
+            <a:extLst>
+              <a:ext uri="{FF2B5EF4-FFF2-40B4-BE49-F238E27FC236}">
+                <a16:creationId xmlns:a16="http://schemas.microsoft.com/office/drawing/2014/main" id="{0F04ACAD-C174-4953-957E-CC1CDC31B2CD}"/>
+              </a:ext>
+            </a:extLst>
+          </p:cNvPr>
+          <p:cNvSpPr txBox="1"/>
+          <p:nvPr/>
+        </p:nvSpPr>
+        <p:spPr>
+          <a:xfrm>
+            <a:off x="6862813" y="1352144"/>
+            <a:ext cx="4928134" cy="1200329"/>
+          </a:xfrm>
+          <a:prstGeom prst="rect">
+            <a:avLst/>
+          </a:prstGeom>
+          <a:noFill/>
+          <a:ln>
+            <a:solidFill>
+              <a:schemeClr val="tx1"/>
+            </a:solidFill>
+          </a:ln>
+        </p:spPr>
+        <p:txBody>
+          <a:bodyPr wrap="square" rtlCol="0">
+            <a:spAutoFit/>
+          </a:bodyPr>
+          <a:lstStyle/>
+          <a:p>
+            <a:r>
+              <a:rPr lang="en-US" dirty="0"/>
+              <a:t>Both offense and defense athletes are trending down from a total crimes committed</a:t>
+            </a:r>
+          </a:p>
+          <a:p>
+            <a:endParaRPr lang="en-US" dirty="0"/>
+          </a:p>
+          <a:p>
+            <a:r>
+              <a:rPr lang="en-US" dirty="0"/>
+              <a:t> </a:t>
+            </a:r>
+          </a:p>
+        </p:txBody>
+      </p:sp>
+      <p:pic>
+        <p:nvPicPr>
+          <p:cNvPr id="8" name="Picture 7">
+            <a:extLst>
+              <a:ext uri="{FF2B5EF4-FFF2-40B4-BE49-F238E27FC236}">
+                <a16:creationId xmlns:a16="http://schemas.microsoft.com/office/drawing/2014/main" id="{DDA2391C-B9E9-413E-B50B-4D30D5FC49AD}"/>
+              </a:ext>
+            </a:extLst>
+          </p:cNvPr>
+          <p:cNvPicPr>
+            <a:picLocks noChangeAspect="1"/>
+          </p:cNvPicPr>
+          <p:nvPr/>
+        </p:nvPicPr>
+        <p:blipFill>
+          <a:blip r:embed="rId3"/>
+          <a:stretch>
+            <a:fillRect/>
+          </a:stretch>
+        </p:blipFill>
+        <p:spPr>
+          <a:xfrm>
+            <a:off x="838200" y="4030750"/>
+            <a:ext cx="5447097" cy="2742857"/>
+          </a:xfrm>
+          <a:prstGeom prst="rect">
+            <a:avLst/>
+          </a:prstGeom>
+          <a:ln>
+            <a:solidFill>
+              <a:schemeClr val="tx1"/>
+            </a:solidFill>
+          </a:ln>
+        </p:spPr>
+      </p:pic>
+    </p:spTree>
+    <p:extLst>
+      <p:ext uri="{BB962C8B-B14F-4D97-AF65-F5344CB8AC3E}">
+        <p14:creationId xmlns:p14="http://schemas.microsoft.com/office/powerpoint/2010/main" val="1937582852"/>
+      </p:ext>
+    </p:extLst>
+  </p:cSld>
+  <p:clrMapOvr>
+    <a:masterClrMapping/>
+  </p:clrMapOvr>
+</p:sld>
+</file>
+
+<file path=ppt/slides/slide4.xml><?xml version="1.0" encoding="utf-8"?>
+<p:sld xmlns:a="http://schemas.openxmlformats.org/drawingml/2006/main" xmlns:r="http://schemas.openxmlformats.org/officeDocument/2006/relationships" xmlns:p="http://schemas.openxmlformats.org/presentationml/2006/main">
+  <p:cSld>
+    <p:spTree>
+      <p:nvGrpSpPr>
+        <p:cNvPr id="1" name=""/>
+        <p:cNvGrpSpPr/>
+        <p:nvPr/>
+      </p:nvGrpSpPr>
+      <p:grpSpPr>
+        <a:xfrm>
+          <a:off x="0" y="0"/>
+          <a:ext cx="0" cy="0"/>
+          <a:chOff x="0" y="0"/>
+          <a:chExt cx="0" cy="0"/>
+        </a:xfrm>
+      </p:grpSpPr>
+      <p:sp>
+        <p:nvSpPr>
+          <p:cNvPr id="2" name="Title 1">
+            <a:extLst>
+              <a:ext uri="{FF2B5EF4-FFF2-40B4-BE49-F238E27FC236}">
+                <a16:creationId xmlns:a16="http://schemas.microsoft.com/office/drawing/2014/main" id="{F8CCFD6C-1C4D-4FFD-BA4D-390E5F0E2313}"/>
+              </a:ext>
+            </a:extLst>
+          </p:cNvPr>
+          <p:cNvSpPr>
+            <a:spLocks noGrp="1"/>
+          </p:cNvSpPr>
+          <p:nvPr>
+            <p:ph type="title"/>
+          </p:nvPr>
+        </p:nvSpPr>
+        <p:spPr/>
+        <p:txBody>
+          <a:bodyPr/>
+          <a:lstStyle/>
+          <a:p>
+            <a:r>
+              <a:rPr lang="en-US" dirty="0"/>
+              <a:t>Pie Chart Crime by Offense or Defense</a:t>
+            </a:r>
+          </a:p>
+        </p:txBody>
+      </p:sp>
+      <p:pic>
+        <p:nvPicPr>
+          <p:cNvPr id="5" name="Picture 4">
+            <a:extLst>
+              <a:ext uri="{FF2B5EF4-FFF2-40B4-BE49-F238E27FC236}">
+                <a16:creationId xmlns:a16="http://schemas.microsoft.com/office/drawing/2014/main" id="{F82C2CB9-174C-4D93-8830-15335AB15D62}"/>
+              </a:ext>
+            </a:extLst>
+          </p:cNvPr>
+          <p:cNvPicPr>
+            <a:picLocks noChangeAspect="1"/>
+          </p:cNvPicPr>
+          <p:nvPr/>
+        </p:nvPicPr>
+        <p:blipFill>
+          <a:blip r:embed="rId2"/>
+          <a:stretch>
+            <a:fillRect/>
+          </a:stretch>
+        </p:blipFill>
+        <p:spPr>
+          <a:xfrm>
+            <a:off x="838200" y="1294599"/>
+            <a:ext cx="5609938" cy="2517006"/>
+          </a:xfrm>
+          <a:prstGeom prst="rect">
+            <a:avLst/>
+          </a:prstGeom>
+          <a:ln>
+            <a:solidFill>
+              <a:schemeClr val="tx1"/>
+            </a:solidFill>
+          </a:ln>
+        </p:spPr>
+      </p:pic>
+      <p:pic>
+        <p:nvPicPr>
+          <p:cNvPr id="6" name="Picture 5">
+            <a:extLst>
+              <a:ext uri="{FF2B5EF4-FFF2-40B4-BE49-F238E27FC236}">
+                <a16:creationId xmlns:a16="http://schemas.microsoft.com/office/drawing/2014/main" id="{2FBF5823-68D7-4F59-A03A-599ADE84CABD}"/>
+              </a:ext>
+            </a:extLst>
+          </p:cNvPr>
+          <p:cNvPicPr>
+            <a:picLocks noChangeAspect="1"/>
+          </p:cNvPicPr>
+          <p:nvPr/>
+        </p:nvPicPr>
+        <p:blipFill rotWithShape="1">
+          <a:blip r:embed="rId3"/>
+          <a:srcRect l="1398" t="2718" r="1880" b="3528"/>
+          <a:stretch/>
+        </p:blipFill>
+        <p:spPr>
+          <a:xfrm>
+            <a:off x="838200" y="4069980"/>
+            <a:ext cx="4100364" cy="2597656"/>
+          </a:xfrm>
+          <a:prstGeom prst="rect">
+            <a:avLst/>
+          </a:prstGeom>
+          <a:ln>
+            <a:solidFill>
+              <a:schemeClr val="tx1"/>
+            </a:solidFill>
+          </a:ln>
+        </p:spPr>
+      </p:pic>
+      <p:pic>
+        <p:nvPicPr>
+          <p:cNvPr id="7" name="Picture 6">
+            <a:extLst>
+              <a:ext uri="{FF2B5EF4-FFF2-40B4-BE49-F238E27FC236}">
+                <a16:creationId xmlns:a16="http://schemas.microsoft.com/office/drawing/2014/main" id="{80AACED5-878A-4863-BFE9-CE8FC921994D}"/>
+              </a:ext>
+            </a:extLst>
+          </p:cNvPr>
+          <p:cNvPicPr>
+            <a:picLocks noChangeAspect="1"/>
+          </p:cNvPicPr>
+          <p:nvPr/>
+        </p:nvPicPr>
+        <p:blipFill>
+          <a:blip r:embed="rId4"/>
+          <a:stretch>
+            <a:fillRect/>
+          </a:stretch>
+        </p:blipFill>
+        <p:spPr>
+          <a:xfrm>
+            <a:off x="6096000" y="4069980"/>
+            <a:ext cx="4100362" cy="2678246"/>
+          </a:xfrm>
+          <a:prstGeom prst="rect">
+            <a:avLst/>
+          </a:prstGeom>
+          <a:ln>
+            <a:solidFill>
+              <a:schemeClr val="tx1"/>
+            </a:solidFill>
+          </a:ln>
+        </p:spPr>
+      </p:pic>
+      <p:sp>
+        <p:nvSpPr>
+          <p:cNvPr id="8" name="TextBox 7">
+            <a:extLst>
+              <a:ext uri="{FF2B5EF4-FFF2-40B4-BE49-F238E27FC236}">
+                <a16:creationId xmlns:a16="http://schemas.microsoft.com/office/drawing/2014/main" id="{8713628E-DEDA-4BA8-80BD-767D9FC4B3D1}"/>
+              </a:ext>
+            </a:extLst>
+          </p:cNvPr>
+          <p:cNvSpPr txBox="1"/>
+          <p:nvPr/>
+        </p:nvSpPr>
+        <p:spPr>
+          <a:xfrm>
+            <a:off x="6939815" y="1294599"/>
+            <a:ext cx="4957010" cy="2585323"/>
+          </a:xfrm>
+          <a:prstGeom prst="rect">
+            <a:avLst/>
+          </a:prstGeom>
+          <a:noFill/>
+          <a:ln w="12700">
+            <a:solidFill>
+              <a:schemeClr val="tx1"/>
+            </a:solidFill>
+          </a:ln>
+        </p:spPr>
+        <p:txBody>
+          <a:bodyPr wrap="square" rtlCol="0">
+            <a:spAutoFit/>
+          </a:bodyPr>
+          <a:lstStyle/>
+          <a:p>
+            <a:r>
+              <a:rPr lang="en-US" dirty="0"/>
+              <a:t>What do we learn about this?</a:t>
+            </a:r>
+          </a:p>
+          <a:p>
+            <a:endParaRPr lang="en-US" dirty="0"/>
+          </a:p>
+          <a:p>
+            <a:r>
+              <a:rPr lang="en-US" dirty="0"/>
+              <a:t>Defensive players have a greater % of crimes committed. </a:t>
+            </a:r>
+          </a:p>
+          <a:p>
+            <a:endParaRPr lang="en-US" dirty="0"/>
+          </a:p>
+          <a:p>
+            <a:r>
+              <a:rPr lang="en-US" dirty="0"/>
+              <a:t>What kind of Crimes are they committing?</a:t>
+            </a:r>
+          </a:p>
+          <a:p>
+            <a:endParaRPr lang="en-US" dirty="0"/>
+          </a:p>
+          <a:p>
+            <a:endParaRPr lang="en-US" dirty="0"/>
+          </a:p>
+          <a:p>
+            <a:endParaRPr lang="en-US" dirty="0"/>
+          </a:p>
+        </p:txBody>
+      </p:sp>
+    </p:spTree>
+    <p:extLst>
+      <p:ext uri="{BB962C8B-B14F-4D97-AF65-F5344CB8AC3E}">
+        <p14:creationId xmlns:p14="http://schemas.microsoft.com/office/powerpoint/2010/main" val="2678138440"/>
+      </p:ext>
+    </p:extLst>
+  </p:cSld>
+  <p:clrMapOvr>
+    <a:masterClrMapping/>
+  </p:clrMapOvr>
+</p:sld>
+</file>
+
+<file path=ppt/slides/slide5.xml><?xml version="1.0" encoding="utf-8"?>
+<p:sld xmlns:a="http://schemas.openxmlformats.org/drawingml/2006/main" xmlns:r="http://schemas.openxmlformats.org/officeDocument/2006/relationships" xmlns:p="http://schemas.openxmlformats.org/presentationml/2006/main">
+  <p:cSld>
+    <p:spTree>
+      <p:nvGrpSpPr>
+        <p:cNvPr id="1" name=""/>
+        <p:cNvGrpSpPr/>
+        <p:nvPr/>
+      </p:nvGrpSpPr>
+      <p:grpSpPr>
+        <a:xfrm>
+          <a:off x="0" y="0"/>
+          <a:ext cx="0" cy="0"/>
+          <a:chOff x="0" y="0"/>
+          <a:chExt cx="0" cy="0"/>
+        </a:xfrm>
+      </p:grpSpPr>
+      <p:sp>
+        <p:nvSpPr>
+          <p:cNvPr id="2" name="Title 1">
+            <a:extLst>
+              <a:ext uri="{FF2B5EF4-FFF2-40B4-BE49-F238E27FC236}">
                 <a16:creationId xmlns:a16="http://schemas.microsoft.com/office/drawing/2014/main" id="{22CA8328-6E6E-4B58-9BD2-B4E4D3777C0D}"/>
               </a:ext>
             </a:extLst>
@@ -4597,8 +4632,8 @@
         </p:nvSpPr>
         <p:spPr>
           <a:xfrm>
-            <a:off x="4264001" y="1075621"/>
-            <a:ext cx="7822069" cy="3583006"/>
+            <a:off x="4406766" y="1075621"/>
+            <a:ext cx="3378468" cy="5417252"/>
           </a:xfrm>
           <a:prstGeom prst="rect">
             <a:avLst/>
@@ -4804,8 +4839,8 @@
         </p:nvSpPr>
         <p:spPr>
           <a:xfrm>
-            <a:off x="4264052" y="5313145"/>
-            <a:ext cx="7822069" cy="1179728"/>
+            <a:off x="8707653" y="1075621"/>
+            <a:ext cx="3378468" cy="5417252"/>
           </a:xfrm>
           <a:prstGeom prst="rect">
             <a:avLst/>
@@ -5053,9 +5088,9 @@
           <p:nvPr/>
         </p:nvCxnSpPr>
         <p:spPr>
-          <a:xfrm flipH="1">
-            <a:off x="6381549" y="4985887"/>
-            <a:ext cx="3723373" cy="0"/>
+          <a:xfrm>
+            <a:off x="8247247" y="889134"/>
+            <a:ext cx="0" cy="5790225"/>
           </a:xfrm>
           <a:prstGeom prst="line">
             <a:avLst/>
@@ -5084,7 +5119,7 @@
     </p:spTree>
     <p:extLst>
       <p:ext uri="{BB962C8B-B14F-4D97-AF65-F5344CB8AC3E}">
-        <p14:creationId xmlns:p14="http://schemas.microsoft.com/office/powerpoint/2010/main" val="4000437216"/>
+        <p14:creationId xmlns:p14="http://schemas.microsoft.com/office/powerpoint/2010/main" val="3263429715"/>
       </p:ext>
     </p:extLst>
   </p:cSld>

</xml_diff>

<commit_message>
updated heat map code & PPT update
</commit_message>
<xml_diff>
--- a/CHADS_CODING/CRIME + NFL.pptx
+++ b/CHADS_CODING/CRIME + NFL.pptx
@@ -3917,18 +3917,27 @@
             </a:r>
           </a:p>
           <a:p>
+            <a:pPr marL="0" indent="0" algn="ctr">
+              <a:buNone/>
+            </a:pPr>
             <a:r>
               <a:rPr lang="en-US" sz="1400" dirty="0"/>
               <a:t>THE EAST COAST HAS THE MAJORITY OF THE CRIMES</a:t>
             </a:r>
           </a:p>
           <a:p>
+            <a:pPr marL="0" indent="0" algn="ctr">
+              <a:buNone/>
+            </a:pPr>
             <a:r>
               <a:rPr lang="en-US" sz="1400" dirty="0"/>
               <a:t>MINNISOTA VIKINGS HAD THE MOST CRIMES OF ANY TEAM</a:t>
             </a:r>
           </a:p>
           <a:p>
+            <a:pPr marL="0" indent="0" algn="ctr">
+              <a:buNone/>
+            </a:pPr>
             <a:r>
               <a:rPr lang="en-US" sz="1400" dirty="0"/>
               <a:t>HOUSTON TEXANS HAD THE FEWEST CRIMES OF ANY TEAM</a:t>

</xml_diff>